<commit_message>
Fixed animations, generalized motivating text
</commit_message>
<xml_diff>
--- a/session-1/Session 1 - Replication Principles.pptx
+++ b/session-1/Session 1 - Replication Principles.pptx
@@ -10,25 +10,25 @@
   <p:sldIdLst>
     <p:sldId id="256" r:id="rId2"/>
     <p:sldId id="287" r:id="rId3"/>
-    <p:sldId id="286" r:id="rId4"/>
-    <p:sldId id="259" r:id="rId5"/>
-    <p:sldId id="261" r:id="rId6"/>
-    <p:sldId id="280" r:id="rId7"/>
-    <p:sldId id="262" r:id="rId8"/>
-    <p:sldId id="268" r:id="rId9"/>
-    <p:sldId id="269" r:id="rId10"/>
-    <p:sldId id="296" r:id="rId11"/>
-    <p:sldId id="263" r:id="rId12"/>
-    <p:sldId id="264" r:id="rId13"/>
-    <p:sldId id="274" r:id="rId14"/>
-    <p:sldId id="272" r:id="rId15"/>
-    <p:sldId id="284" r:id="rId16"/>
-    <p:sldId id="266" r:id="rId17"/>
-    <p:sldId id="276" r:id="rId18"/>
-    <p:sldId id="302" r:id="rId19"/>
-    <p:sldId id="319" r:id="rId20"/>
-    <p:sldId id="318" r:id="rId21"/>
-    <p:sldId id="285" r:id="rId22"/>
+    <p:sldId id="259" r:id="rId4"/>
+    <p:sldId id="261" r:id="rId5"/>
+    <p:sldId id="280" r:id="rId6"/>
+    <p:sldId id="262" r:id="rId7"/>
+    <p:sldId id="268" r:id="rId8"/>
+    <p:sldId id="269" r:id="rId9"/>
+    <p:sldId id="296" r:id="rId10"/>
+    <p:sldId id="263" r:id="rId11"/>
+    <p:sldId id="264" r:id="rId12"/>
+    <p:sldId id="274" r:id="rId13"/>
+    <p:sldId id="272" r:id="rId14"/>
+    <p:sldId id="284" r:id="rId15"/>
+    <p:sldId id="266" r:id="rId16"/>
+    <p:sldId id="276" r:id="rId17"/>
+    <p:sldId id="302" r:id="rId18"/>
+    <p:sldId id="319" r:id="rId19"/>
+    <p:sldId id="318" r:id="rId20"/>
+    <p:sldId id="285" r:id="rId21"/>
+    <p:sldId id="320" r:id="rId22"/>
   </p:sldIdLst>
   <p:sldSz cx="9144000" cy="6858000" type="screen4x3"/>
   <p:notesSz cx="7010400" cy="9236075"/>
@@ -310,6 +310,7 @@
     <p1510:client id="{A0BF277A-F909-51ED-3905-702FCCB698DA}" v="303" dt="2023-06-06T02:35:51.438"/>
     <p1510:client id="{A29EF2C3-BCC3-FE84-9E28-8AC5DC878225}" v="268" dt="2023-01-11T21:51:26.734"/>
     <p1510:client id="{A32F9E8B-DABB-46EA-BA82-0D17199FCB6C}" v="204" dt="2019-11-15T02:21:11.744"/>
+    <p1510:client id="{A34BEB02-4032-9EEC-160C-7BD550C36278}" v="171" dt="2023-08-14T00:31:28.524"/>
     <p1510:client id="{ABC40ABF-CC0A-4585-9AB1-0C4661091F47}" v="83" dt="2020-01-17T02:05:53.015"/>
     <p1510:client id="{AE6C6439-0ED1-6924-ACC7-1196F0FEF6C6}" v="62" dt="2023-01-05T18:53:54.867"/>
     <p1510:client id="{B270706C-2E8A-DAE0-AD05-13A0EC2FCBFE}" v="355" dt="2023-01-10T04:12:59.024"/>
@@ -5752,6 +5753,136 @@
             <pc:docMk/>
             <pc:sldMk cId="0" sldId="280"/>
             <ac:spMk id="290" creationId="{00000000-0000-0000-0000-000000000000}"/>
+          </ac:spMkLst>
+        </pc:spChg>
+      </pc:sldChg>
+    </pc:docChg>
+  </pc:docChgLst>
+  <pc:docChgLst>
+    <pc:chgData name="John Patrick Johnson" userId="S::jpj8711@ads.northwestern.edu::fe18dc51-e5c5-41f0-a67f-64543119935e" providerId="AD" clId="Web-{A34BEB02-4032-9EEC-160C-7BD550C36278}"/>
+    <pc:docChg chg="delSld modSld">
+      <pc:chgData name="John Patrick Johnson" userId="S::jpj8711@ads.northwestern.edu::fe18dc51-e5c5-41f0-a67f-64543119935e" providerId="AD" clId="Web-{A34BEB02-4032-9EEC-160C-7BD550C36278}" dt="2023-08-14T00:31:28.524" v="165"/>
+      <pc:docMkLst>
+        <pc:docMk/>
+      </pc:docMkLst>
+      <pc:sldChg chg="modSp">
+        <pc:chgData name="John Patrick Johnson" userId="S::jpj8711@ads.northwestern.edu::fe18dc51-e5c5-41f0-a67f-64543119935e" providerId="AD" clId="Web-{A34BEB02-4032-9EEC-160C-7BD550C36278}" dt="2023-08-14T00:26:34.845" v="94" actId="20577"/>
+        <pc:sldMkLst>
+          <pc:docMk/>
+          <pc:sldMk cId="0" sldId="259"/>
+        </pc:sldMkLst>
+        <pc:spChg chg="mod">
+          <ac:chgData name="John Patrick Johnson" userId="S::jpj8711@ads.northwestern.edu::fe18dc51-e5c5-41f0-a67f-64543119935e" providerId="AD" clId="Web-{A34BEB02-4032-9EEC-160C-7BD550C36278}" dt="2023-08-14T00:26:34.845" v="94" actId="20577"/>
+          <ac:spMkLst>
+            <pc:docMk/>
+            <pc:sldMk cId="0" sldId="259"/>
+            <ac:spMk id="77" creationId="{00000000-0000-0000-0000-000000000000}"/>
+          </ac:spMkLst>
+        </pc:spChg>
+      </pc:sldChg>
+      <pc:sldChg chg="modSp">
+        <pc:chgData name="John Patrick Johnson" userId="S::jpj8711@ads.northwestern.edu::fe18dc51-e5c5-41f0-a67f-64543119935e" providerId="AD" clId="Web-{A34BEB02-4032-9EEC-160C-7BD550C36278}" dt="2023-08-14T00:29:16.239" v="152" actId="20577"/>
+        <pc:sldMkLst>
+          <pc:docMk/>
+          <pc:sldMk cId="0" sldId="261"/>
+        </pc:sldMkLst>
+        <pc:spChg chg="mod">
+          <ac:chgData name="John Patrick Johnson" userId="S::jpj8711@ads.northwestern.edu::fe18dc51-e5c5-41f0-a67f-64543119935e" providerId="AD" clId="Web-{A34BEB02-4032-9EEC-160C-7BD550C36278}" dt="2023-08-14T00:29:16.239" v="152" actId="20577"/>
+          <ac:spMkLst>
+            <pc:docMk/>
+            <pc:sldMk cId="0" sldId="261"/>
+            <ac:spMk id="97" creationId="{00000000-0000-0000-0000-000000000000}"/>
+          </ac:spMkLst>
+        </pc:spChg>
+      </pc:sldChg>
+      <pc:sldChg chg="modSp addAnim">
+        <pc:chgData name="John Patrick Johnson" userId="S::jpj8711@ads.northwestern.edu::fe18dc51-e5c5-41f0-a67f-64543119935e" providerId="AD" clId="Web-{A34BEB02-4032-9EEC-160C-7BD550C36278}" dt="2023-08-14T00:31:28.524" v="165"/>
+        <pc:sldMkLst>
+          <pc:docMk/>
+          <pc:sldMk cId="0" sldId="280"/>
+        </pc:sldMkLst>
+        <pc:spChg chg="mod">
+          <ac:chgData name="John Patrick Johnson" userId="S::jpj8711@ads.northwestern.edu::fe18dc51-e5c5-41f0-a67f-64543119935e" providerId="AD" clId="Web-{A34BEB02-4032-9EEC-160C-7BD550C36278}" dt="2023-08-13T22:51:32.401" v="37" actId="20577"/>
+          <ac:spMkLst>
+            <pc:docMk/>
+            <pc:sldMk cId="0" sldId="280"/>
+            <ac:spMk id="5" creationId="{B64D9B12-D05E-D196-1CEC-9C9E33B9CC0F}"/>
+          </ac:spMkLst>
+        </pc:spChg>
+        <pc:spChg chg="mod">
+          <ac:chgData name="John Patrick Johnson" userId="S::jpj8711@ads.northwestern.edu::fe18dc51-e5c5-41f0-a67f-64543119935e" providerId="AD" clId="Web-{A34BEB02-4032-9EEC-160C-7BD550C36278}" dt="2023-08-13T22:50:32.695" v="16" actId="20577"/>
+          <ac:spMkLst>
+            <pc:docMk/>
+            <pc:sldMk cId="0" sldId="280"/>
+            <ac:spMk id="7" creationId="{B1E2236B-464B-AA49-A124-3E054A3AC455}"/>
+          </ac:spMkLst>
+        </pc:spChg>
+        <pc:spChg chg="mod">
+          <ac:chgData name="John Patrick Johnson" userId="S::jpj8711@ads.northwestern.edu::fe18dc51-e5c5-41f0-a67f-64543119935e" providerId="AD" clId="Web-{A34BEB02-4032-9EEC-160C-7BD550C36278}" dt="2023-08-14T00:29:58.256" v="163" actId="20577"/>
+          <ac:spMkLst>
+            <pc:docMk/>
+            <pc:sldMk cId="0" sldId="280"/>
+            <ac:spMk id="287" creationId="{00000000-0000-0000-0000-000000000000}"/>
+          </ac:spMkLst>
+        </pc:spChg>
+        <pc:spChg chg="mod">
+          <ac:chgData name="John Patrick Johnson" userId="S::jpj8711@ads.northwestern.edu::fe18dc51-e5c5-41f0-a67f-64543119935e" providerId="AD" clId="Web-{A34BEB02-4032-9EEC-160C-7BD550C36278}" dt="2023-08-13T22:51:16.806" v="35" actId="14100"/>
+          <ac:spMkLst>
+            <pc:docMk/>
+            <pc:sldMk cId="0" sldId="280"/>
+            <ac:spMk id="290" creationId="{00000000-0000-0000-0000-000000000000}"/>
+          </ac:spMkLst>
+        </pc:spChg>
+        <pc:picChg chg="mod">
+          <ac:chgData name="John Patrick Johnson" userId="S::jpj8711@ads.northwestern.edu::fe18dc51-e5c5-41f0-a67f-64543119935e" providerId="AD" clId="Web-{A34BEB02-4032-9EEC-160C-7BD550C36278}" dt="2023-08-14T00:30:53.492" v="164" actId="1076"/>
+          <ac:picMkLst>
+            <pc:docMk/>
+            <pc:sldMk cId="0" sldId="280"/>
+            <ac:picMk id="8" creationId="{3982F08A-63A5-51F7-67BC-B202A343FBFF}"/>
+          </ac:picMkLst>
+        </pc:picChg>
+      </pc:sldChg>
+      <pc:sldChg chg="del">
+        <pc:chgData name="John Patrick Johnson" userId="S::jpj8711@ads.northwestern.edu::fe18dc51-e5c5-41f0-a67f-64543119935e" providerId="AD" clId="Web-{A34BEB02-4032-9EEC-160C-7BD550C36278}" dt="2023-08-13T21:59:59.933" v="0"/>
+        <pc:sldMkLst>
+          <pc:docMk/>
+          <pc:sldMk cId="3056279571" sldId="286"/>
+        </pc:sldMkLst>
+      </pc:sldChg>
+      <pc:sldChg chg="mod modShow">
+        <pc:chgData name="John Patrick Johnson" userId="S::jpj8711@ads.northwestern.edu::fe18dc51-e5c5-41f0-a67f-64543119935e" providerId="AD" clId="Web-{A34BEB02-4032-9EEC-160C-7BD550C36278}" dt="2023-08-14T00:26:13.876" v="92"/>
+        <pc:sldMkLst>
+          <pc:docMk/>
+          <pc:sldMk cId="60139911" sldId="287"/>
+        </pc:sldMkLst>
+      </pc:sldChg>
+      <pc:sldChg chg="modSp">
+        <pc:chgData name="John Patrick Johnson" userId="S::jpj8711@ads.northwestern.edu::fe18dc51-e5c5-41f0-a67f-64543119935e" providerId="AD" clId="Web-{A34BEB02-4032-9EEC-160C-7BD550C36278}" dt="2023-08-14T00:25:53.063" v="91" actId="20577"/>
+        <pc:sldMkLst>
+          <pc:docMk/>
+          <pc:sldMk cId="348769654" sldId="318"/>
+        </pc:sldMkLst>
+        <pc:spChg chg="mod">
+          <ac:chgData name="John Patrick Johnson" userId="S::jpj8711@ads.northwestern.edu::fe18dc51-e5c5-41f0-a67f-64543119935e" providerId="AD" clId="Web-{A34BEB02-4032-9EEC-160C-7BD550C36278}" dt="2023-08-14T00:25:53.063" v="91" actId="20577"/>
+          <ac:spMkLst>
+            <pc:docMk/>
+            <pc:sldMk cId="348769654" sldId="318"/>
+            <ac:spMk id="3" creationId="{EC9AA3F7-FC6E-575A-F3F6-82A49486401E}"/>
+          </ac:spMkLst>
+        </pc:spChg>
+      </pc:sldChg>
+      <pc:sldChg chg="modSp">
+        <pc:chgData name="John Patrick Johnson" userId="S::jpj8711@ads.northwestern.edu::fe18dc51-e5c5-41f0-a67f-64543119935e" providerId="AD" clId="Web-{A34BEB02-4032-9EEC-160C-7BD550C36278}" dt="2023-08-14T00:25:43" v="86" actId="20577"/>
+        <pc:sldMkLst>
+          <pc:docMk/>
+          <pc:sldMk cId="679280969" sldId="319"/>
+        </pc:sldMkLst>
+        <pc:spChg chg="mod">
+          <ac:chgData name="John Patrick Johnson" userId="S::jpj8711@ads.northwestern.edu::fe18dc51-e5c5-41f0-a67f-64543119935e" providerId="AD" clId="Web-{A34BEB02-4032-9EEC-160C-7BD550C36278}" dt="2023-08-14T00:25:43" v="86" actId="20577"/>
+          <ac:spMkLst>
+            <pc:docMk/>
+            <pc:sldMk cId="679280969" sldId="319"/>
+            <ac:spMk id="3" creationId="{838492E3-91C7-FA09-1EED-65C4220C1E22}"/>
           </ac:spMkLst>
         </pc:spChg>
       </pc:sldChg>
@@ -8318,7 +8449,7 @@
             </a:pPr>
             <a:fld id="{00000000-1234-1234-1234-123412341234}" type="slidenum">
               <a:rPr lang="en-US"/>
-              <a:t>11</a:t>
+              <a:t>10</a:t>
             </a:fld>
             <a:endParaRPr/>
           </a:p>
@@ -8556,7 +8687,7 @@
             </a:pPr>
             <a:fld id="{00000000-1234-1234-1234-123412341234}" type="slidenum">
               <a:rPr lang="en-US"/>
-              <a:t>12</a:t>
+              <a:t>11</a:t>
             </a:fld>
             <a:endParaRPr/>
           </a:p>
@@ -8861,7 +8992,7 @@
             </a:pPr>
             <a:fld id="{00000000-1234-1234-1234-123412341234}" type="slidenum">
               <a:rPr lang="en-US"/>
-              <a:t>13</a:t>
+              <a:t>12</a:t>
             </a:fld>
             <a:endParaRPr/>
           </a:p>
@@ -9150,7 +9281,7 @@
             </a:pPr>
             <a:fld id="{00000000-1234-1234-1234-123412341234}" type="slidenum">
               <a:rPr lang="en-US"/>
-              <a:t>14</a:t>
+              <a:t>13</a:t>
             </a:fld>
             <a:endParaRPr/>
           </a:p>
@@ -9402,7 +9533,7 @@
             </a:pPr>
             <a:fld id="{00000000-1234-1234-1234-123412341234}" type="slidenum">
               <a:rPr lang="en-US"/>
-              <a:t>15</a:t>
+              <a:t>14</a:t>
             </a:fld>
             <a:endParaRPr/>
           </a:p>
@@ -9740,7 +9871,7 @@
             </a:pPr>
             <a:fld id="{00000000-1234-1234-1234-123412341234}" type="slidenum">
               <a:rPr lang="en-US"/>
-              <a:t>16</a:t>
+              <a:t>15</a:t>
             </a:fld>
             <a:endParaRPr/>
           </a:p>
@@ -9992,7 +10123,7 @@
             </a:pPr>
             <a:fld id="{00000000-1234-1234-1234-123412341234}" type="slidenum">
               <a:rPr lang="en-US"/>
-              <a:t>17</a:t>
+              <a:t>16</a:t>
             </a:fld>
             <a:endParaRPr/>
           </a:p>
@@ -10244,7 +10375,7 @@
             </a:pPr>
             <a:fld id="{00000000-1234-1234-1234-123412341234}" type="slidenum">
               <a:rPr lang="en-US"/>
-              <a:t>18</a:t>
+              <a:t>17</a:t>
             </a:fld>
             <a:endParaRPr/>
           </a:p>
@@ -10397,7 +10528,7 @@
                 <a:cs typeface="Calibri"/>
                 <a:sym typeface="Calibri"/>
               </a:rPr>
-              <a:t>19</a:t>
+              <a:t>18</a:t>
             </a:fld>
             <a:endParaRPr lang="en-US" sz="1200" b="0" i="0" u="none" strike="noStrike" cap="none">
               <a:solidFill>
@@ -10662,7 +10793,7 @@
             </a:pPr>
             <a:fld id="{00000000-1234-1234-1234-123412341234}" type="slidenum">
               <a:rPr lang="en-US"/>
-              <a:t>21</a:t>
+              <a:t>20</a:t>
             </a:fld>
             <a:endParaRPr/>
           </a:p>
@@ -10833,6 +10964,283 @@
     <p:extLst>
       <p:ext uri="{BB962C8B-B14F-4D97-AF65-F5344CB8AC3E}">
         <p14:creationId xmlns:p14="http://schemas.microsoft.com/office/powerpoint/2010/main" val="523752762"/>
+      </p:ext>
+    </p:extLst>
+  </p:cSld>
+  <p:clrMapOvr>
+    <a:masterClrMapping/>
+  </p:clrMapOvr>
+</p:notes>
+</file>
+
+<file path=ppt/notesSlides/notesSlide20.xml><?xml version="1.0" encoding="utf-8"?>
+<p:notes xmlns:a="http://schemas.openxmlformats.org/drawingml/2006/main" xmlns:r="http://schemas.openxmlformats.org/officeDocument/2006/relationships" xmlns:p="http://schemas.openxmlformats.org/presentationml/2006/main">
+  <p:cSld>
+    <p:spTree>
+      <p:nvGrpSpPr>
+        <p:cNvPr id="1" name=""/>
+        <p:cNvGrpSpPr/>
+        <p:nvPr/>
+      </p:nvGrpSpPr>
+      <p:grpSpPr>
+        <a:xfrm>
+          <a:off x="0" y="0"/>
+          <a:ext cx="0" cy="0"/>
+          <a:chOff x="0" y="0"/>
+          <a:chExt cx="0" cy="0"/>
+        </a:xfrm>
+      </p:grpSpPr>
+      <p:sp>
+        <p:nvSpPr>
+          <p:cNvPr id="2" name="Slide Image Placeholder 1"/>
+          <p:cNvSpPr>
+            <a:spLocks noGrp="1" noRot="1" noChangeAspect="1"/>
+          </p:cNvSpPr>
+          <p:nvPr>
+            <p:ph type="sldImg"/>
+          </p:nvPr>
+        </p:nvSpPr>
+        <p:spPr/>
+      </p:sp>
+      <p:sp>
+        <p:nvSpPr>
+          <p:cNvPr id="3" name="Notes Placeholder 2"/>
+          <p:cNvSpPr>
+            <a:spLocks noGrp="1"/>
+          </p:cNvSpPr>
+          <p:nvPr>
+            <p:ph type="body" idx="1"/>
+          </p:nvPr>
+        </p:nvSpPr>
+        <p:spPr/>
+        <p:txBody>
+          <a:bodyPr/>
+          <a:lstStyle/>
+          <a:p>
+            <a:r>
+              <a:rPr lang="en-US" b="1"/>
+              <a:t>Actions to Demonstrate and Explain</a:t>
+            </a:r>
+            <a:endParaRPr lang="en-US"/>
+          </a:p>
+          <a:p>
+            <a:r>
+              <a:rPr lang="en-US"/>
+              <a:t>Log into KLC using </a:t>
+            </a:r>
+            <a:r>
+              <a:rPr lang="en-US" err="1"/>
+              <a:t>FastX</a:t>
+            </a:r>
+            <a:r>
+              <a:rPr lang="en-US"/>
+              <a:t> in browser</a:t>
+            </a:r>
+          </a:p>
+          <a:p>
+            <a:r>
+              <a:rPr lang="en-US"/>
+              <a:t>Navigate directories with cd and ls</a:t>
+            </a:r>
+          </a:p>
+          <a:p>
+            <a:pPr marL="285750" indent="-285750">
+              <a:buFont typeface="Symbol"/>
+              <a:buChar char="•"/>
+            </a:pPr>
+            <a:r>
+              <a:rPr lang="en-US"/>
+              <a:t>Where to store which files?</a:t>
+            </a:r>
+          </a:p>
+          <a:p>
+            <a:pPr indent="0"/>
+            <a:r>
+              <a:rPr lang="en-US"/>
+              <a:t>Make a directory with git clone</a:t>
+            </a:r>
+          </a:p>
+          <a:p>
+            <a:r>
+              <a:rPr lang="en-US"/>
+              <a:t>Load module</a:t>
+            </a:r>
+          </a:p>
+          <a:p>
+            <a:pPr marL="285750" indent="-285750">
+              <a:buFont typeface="Symbol"/>
+              <a:buChar char="•"/>
+            </a:pPr>
+            <a:r>
+              <a:rPr lang="en-US"/>
+              <a:t>Note software version</a:t>
+            </a:r>
+          </a:p>
+          <a:p>
+            <a:pPr indent="0"/>
+            <a:r>
+              <a:rPr lang="en-US"/>
+              <a:t>Open a file with nano, inspect contents, make a minor change (like update a parameter)</a:t>
+            </a:r>
+          </a:p>
+          <a:p>
+            <a:r>
+              <a:rPr lang="en-US" dirty="0"/>
+              <a:t>Open a program file using a GUI</a:t>
+            </a:r>
+          </a:p>
+          <a:p>
+            <a:pPr marL="285750" indent="-285750">
+              <a:buFont typeface="Symbol"/>
+              <a:buChar char="•"/>
+            </a:pPr>
+            <a:r>
+              <a:rPr lang="en-US" dirty="0"/>
+              <a:t>R program in </a:t>
+            </a:r>
+            <a:r>
+              <a:rPr lang="en-US" dirty="0" err="1"/>
+              <a:t>rstudio</a:t>
+            </a:r>
+          </a:p>
+          <a:p>
+            <a:pPr marL="285750" indent="-285750">
+              <a:buFont typeface="Symbol"/>
+              <a:buChar char="•"/>
+            </a:pPr>
+            <a:r>
+              <a:rPr lang="en-US" dirty="0"/>
+              <a:t>Stata .do file in </a:t>
+            </a:r>
+            <a:r>
+              <a:rPr lang="en-US" dirty="0" err="1"/>
+              <a:t>xstata</a:t>
+            </a:r>
+            <a:r>
+              <a:rPr lang="en-US" dirty="0"/>
+              <a:t>-se</a:t>
+            </a:r>
+          </a:p>
+          <a:p>
+            <a:pPr marL="285750" indent="-285750">
+              <a:buFont typeface="Symbol"/>
+              <a:buChar char="•"/>
+            </a:pPr>
+            <a:r>
+              <a:rPr lang="en-US" dirty="0"/>
+              <a:t>Python in a </a:t>
+            </a:r>
+            <a:r>
+              <a:rPr lang="en-US" dirty="0" err="1"/>
+              <a:t>Jupyter</a:t>
+            </a:r>
+            <a:r>
+              <a:rPr lang="en-US" dirty="0"/>
+              <a:t> notebook </a:t>
+            </a:r>
+          </a:p>
+          <a:p>
+            <a:pPr marL="285750" indent="-285750">
+              <a:buFont typeface="Symbol"/>
+              <a:buChar char="•"/>
+            </a:pPr>
+            <a:r>
+              <a:rPr lang="en-US" dirty="0"/>
+              <a:t>When to use GUI versus headless batch process</a:t>
+            </a:r>
+          </a:p>
+          <a:p>
+            <a:pPr marL="285750" indent="-285750">
+              <a:buFont typeface="Symbol"/>
+              <a:buChar char="•"/>
+            </a:pPr>
+            <a:r>
+              <a:rPr lang="en-US" dirty="0"/>
+              <a:t>Repeat R, Stata programs from command line</a:t>
+            </a:r>
+          </a:p>
+          <a:p>
+            <a:pPr marL="285750" indent="-285750">
+              <a:buFont typeface="Symbol"/>
+              <a:buChar char="•"/>
+            </a:pPr>
+            <a:r>
+              <a:rPr lang="en-US" dirty="0"/>
+              <a:t>Inspect output</a:t>
+            </a:r>
+          </a:p>
+          <a:p>
+            <a:pPr indent="0"/>
+            <a:r>
+              <a:rPr lang="en-US" dirty="0"/>
+              <a:t>Save changes and commit back to GitHub repo</a:t>
+            </a:r>
+          </a:p>
+          <a:p>
+            <a:endParaRPr lang="en-US" dirty="0"/>
+          </a:p>
+        </p:txBody>
+      </p:sp>
+      <p:sp>
+        <p:nvSpPr>
+          <p:cNvPr id="4" name="Slide Number Placeholder 3"/>
+          <p:cNvSpPr>
+            <a:spLocks noGrp="1"/>
+          </p:cNvSpPr>
+          <p:nvPr>
+            <p:ph type="sldNum" idx="12"/>
+          </p:nvPr>
+        </p:nvSpPr>
+        <p:spPr/>
+        <p:txBody>
+          <a:bodyPr/>
+          <a:lstStyle/>
+          <a:p>
+            <a:pPr marL="0" marR="0" lvl="0" indent="0" algn="r" rtl="0">
+              <a:lnSpc>
+                <a:spcPct val="100000"/>
+              </a:lnSpc>
+              <a:spcBef>
+                <a:spcPts val="0"/>
+              </a:spcBef>
+              <a:spcAft>
+                <a:spcPts val="0"/>
+              </a:spcAft>
+              <a:buClr>
+                <a:srgbClr val="000000"/>
+              </a:buClr>
+              <a:buSzPts val="1200"/>
+              <a:buFont typeface="Arial"/>
+              <a:buNone/>
+            </a:pPr>
+            <a:fld id="{00000000-1234-1234-1234-123412341234}" type="slidenum">
+              <a:rPr lang="en-US" sz="1200" b="0" i="0" u="none" strike="noStrike" cap="none">
+                <a:solidFill>
+                  <a:schemeClr val="dk1"/>
+                </a:solidFill>
+                <a:latin typeface="Calibri"/>
+                <a:ea typeface="Calibri"/>
+                <a:cs typeface="Calibri"/>
+                <a:sym typeface="Calibri"/>
+              </a:rPr>
+              <a:t>21</a:t>
+            </a:fld>
+            <a:endParaRPr lang="en-US" sz="1200" b="0" i="0" u="none" strike="noStrike" cap="none">
+              <a:solidFill>
+                <a:schemeClr val="dk1"/>
+              </a:solidFill>
+              <a:latin typeface="Calibri"/>
+              <a:ea typeface="Calibri"/>
+              <a:cs typeface="Calibri"/>
+              <a:sym typeface="Calibri"/>
+            </a:endParaRPr>
+          </a:p>
+        </p:txBody>
+      </p:sp>
+    </p:spTree>
+    <p:extLst>
+      <p:ext uri="{BB962C8B-B14F-4D97-AF65-F5344CB8AC3E}">
+        <p14:creationId xmlns:p14="http://schemas.microsoft.com/office/powerpoint/2010/main" val="2249956328"/>
       </p:ext>
     </p:extLst>
   </p:cSld>
@@ -11152,7 +11560,7 @@
             </a:pPr>
             <a:fld id="{00000000-1234-1234-1234-123412341234}" type="slidenum">
               <a:rPr lang="en-US"/>
-              <a:t>4</a:t>
+              <a:t>3</a:t>
             </a:fld>
             <a:endParaRPr/>
           </a:p>
@@ -11518,7 +11926,7 @@
             </a:pPr>
             <a:fld id="{00000000-1234-1234-1234-123412341234}" type="slidenum">
               <a:rPr lang="en-US"/>
-              <a:t>5</a:t>
+              <a:t>4</a:t>
             </a:fld>
             <a:endParaRPr/>
           </a:p>
@@ -11751,7 +12159,7 @@
             </a:pPr>
             <a:fld id="{00000000-1234-1234-1234-123412341234}" type="slidenum">
               <a:rPr lang="en-US"/>
-              <a:t>6</a:t>
+              <a:t>5</a:t>
             </a:fld>
             <a:endParaRPr/>
           </a:p>
@@ -12018,7 +12426,7 @@
             </a:pPr>
             <a:fld id="{00000000-1234-1234-1234-123412341234}" type="slidenum">
               <a:rPr lang="en-US"/>
-              <a:t>7</a:t>
+              <a:t>6</a:t>
             </a:fld>
             <a:endParaRPr/>
           </a:p>
@@ -12365,7 +12773,7 @@
             </a:pPr>
             <a:fld id="{00000000-1234-1234-1234-123412341234}" type="slidenum">
               <a:rPr lang="en-US"/>
-              <a:t>8</a:t>
+              <a:t>7</a:t>
             </a:fld>
             <a:endParaRPr/>
           </a:p>
@@ -12655,7 +13063,7 @@
             </a:pPr>
             <a:fld id="{00000000-1234-1234-1234-123412341234}" type="slidenum">
               <a:rPr lang="en-US"/>
-              <a:t>9</a:t>
+              <a:t>8</a:t>
             </a:fld>
             <a:endParaRPr/>
           </a:p>
@@ -12945,7 +13353,7 @@
             </a:pPr>
             <a:fld id="{00000000-1234-1234-1234-123412341234}" type="slidenum">
               <a:rPr lang="en-US"/>
-              <a:t>10</a:t>
+              <a:t>9</a:t>
             </a:fld>
             <a:endParaRPr/>
           </a:p>
@@ -19454,302 +19862,6 @@
   <p:cSld>
     <p:spTree>
       <p:nvGrpSpPr>
-        <p:cNvPr id="1" name="Shape 175"/>
-        <p:cNvGrpSpPr/>
-        <p:nvPr/>
-      </p:nvGrpSpPr>
-      <p:grpSpPr>
-        <a:xfrm>
-          <a:off x="0" y="0"/>
-          <a:ext cx="0" cy="0"/>
-          <a:chOff x="0" y="0"/>
-          <a:chExt cx="0" cy="0"/>
-        </a:xfrm>
-      </p:grpSpPr>
-      <p:sp>
-        <p:nvSpPr>
-          <p:cNvPr id="176" name="Google Shape;176;p21"/>
-          <p:cNvSpPr txBox="1">
-            <a:spLocks noGrp="1"/>
-          </p:cNvSpPr>
-          <p:nvPr>
-            <p:ph type="title"/>
-          </p:nvPr>
-        </p:nvSpPr>
-        <p:spPr>
-          <a:xfrm>
-            <a:off x="457200" y="0"/>
-            <a:ext cx="8229600" cy="1143000"/>
-          </a:xfrm>
-          <a:prstGeom prst="rect">
-            <a:avLst/>
-          </a:prstGeom>
-          <a:noFill/>
-          <a:ln>
-            <a:noFill/>
-          </a:ln>
-        </p:spPr>
-        <p:txBody>
-          <a:bodyPr spcFirstLastPara="1" wrap="square" lIns="91425" tIns="45700" rIns="91425" bIns="45700" anchor="ctr" anchorCtr="0">
-            <a:noAutofit/>
-          </a:bodyPr>
-          <a:lstStyle/>
-          <a:p>
-            <a:r>
-              <a:rPr lang="en-US"/>
-              <a:t>Automation Opportunities For You?</a:t>
-            </a:r>
-          </a:p>
-        </p:txBody>
-      </p:sp>
-      <p:sp>
-        <p:nvSpPr>
-          <p:cNvPr id="177" name="Google Shape;177;p21"/>
-          <p:cNvSpPr txBox="1">
-            <a:spLocks noGrp="1"/>
-          </p:cNvSpPr>
-          <p:nvPr>
-            <p:ph type="ftr" idx="11"/>
-          </p:nvPr>
-        </p:nvSpPr>
-        <p:spPr>
-          <a:xfrm>
-            <a:off x="4572000" y="6506896"/>
-            <a:ext cx="4114800" cy="365100"/>
-          </a:xfrm>
-          <a:prstGeom prst="rect">
-            <a:avLst/>
-          </a:prstGeom>
-          <a:noFill/>
-          <a:ln>
-            <a:noFill/>
-          </a:ln>
-        </p:spPr>
-        <p:txBody>
-          <a:bodyPr spcFirstLastPara="1" wrap="square" lIns="91425" tIns="45700" rIns="91425" bIns="45700" anchor="ctr" anchorCtr="0">
-            <a:noAutofit/>
-          </a:bodyPr>
-          <a:lstStyle/>
-          <a:p>
-            <a:pPr marL="0" lvl="0" indent="0" algn="r" rtl="0">
-              <a:lnSpc>
-                <a:spcPct val="100000"/>
-              </a:lnSpc>
-              <a:spcBef>
-                <a:spcPts val="0"/>
-              </a:spcBef>
-              <a:spcAft>
-                <a:spcPts val="0"/>
-              </a:spcAft>
-              <a:buSzPts val="1400"/>
-              <a:buNone/>
-            </a:pPr>
-            <a:r>
-              <a:rPr lang="en-US"/>
-              <a:t>Reproducibility Principles</a:t>
-            </a:r>
-            <a:endParaRPr/>
-          </a:p>
-        </p:txBody>
-      </p:sp>
-      <p:pic>
-        <p:nvPicPr>
-          <p:cNvPr id="4" name="Picture 4" descr="Graphical user interface, application&#10;&#10;Description automatically generated">
-            <a:extLst>
-              <a:ext uri="{FF2B5EF4-FFF2-40B4-BE49-F238E27FC236}">
-                <a16:creationId xmlns:a16="http://schemas.microsoft.com/office/drawing/2014/main" id="{3DC87846-D2C9-27E3-BCF5-F54BA0E4016D}"/>
-              </a:ext>
-            </a:extLst>
-          </p:cNvPr>
-          <p:cNvPicPr>
-            <a:picLocks noChangeAspect="1"/>
-          </p:cNvPicPr>
-          <p:nvPr/>
-        </p:nvPicPr>
-        <p:blipFill>
-          <a:blip r:embed="rId3"/>
-          <a:stretch>
-            <a:fillRect/>
-          </a:stretch>
-        </p:blipFill>
-        <p:spPr>
-          <a:xfrm>
-            <a:off x="4620036" y="1519050"/>
-            <a:ext cx="4453581" cy="1533158"/>
-          </a:xfrm>
-          <a:prstGeom prst="rect">
-            <a:avLst/>
-          </a:prstGeom>
-          <a:ln>
-            <a:solidFill>
-              <a:schemeClr val="tx1"/>
-            </a:solidFill>
-          </a:ln>
-        </p:spPr>
-      </p:pic>
-      <p:pic>
-        <p:nvPicPr>
-          <p:cNvPr id="5" name="Picture 5" descr="Graphical user interface, application&#10;&#10;Description automatically generated">
-            <a:extLst>
-              <a:ext uri="{FF2B5EF4-FFF2-40B4-BE49-F238E27FC236}">
-                <a16:creationId xmlns:a16="http://schemas.microsoft.com/office/drawing/2014/main" id="{74EB437C-D31C-B442-1FB8-A6B4E1F09824}"/>
-              </a:ext>
-            </a:extLst>
-          </p:cNvPr>
-          <p:cNvPicPr>
-            <a:picLocks noChangeAspect="1"/>
-          </p:cNvPicPr>
-          <p:nvPr/>
-        </p:nvPicPr>
-        <p:blipFill>
-          <a:blip r:embed="rId4"/>
-          <a:stretch>
-            <a:fillRect/>
-          </a:stretch>
-        </p:blipFill>
-        <p:spPr>
-          <a:xfrm>
-            <a:off x="205646" y="1146597"/>
-            <a:ext cx="4234355" cy="2975254"/>
-          </a:xfrm>
-          <a:prstGeom prst="rect">
-            <a:avLst/>
-          </a:prstGeom>
-          <a:ln>
-            <a:solidFill>
-              <a:schemeClr val="tx1"/>
-            </a:solidFill>
-          </a:ln>
-        </p:spPr>
-      </p:pic>
-      <p:pic>
-        <p:nvPicPr>
-          <p:cNvPr id="6" name="Picture 6" descr="Graphical user interface, text, application, email&#10;&#10;Description automatically generated">
-            <a:extLst>
-              <a:ext uri="{FF2B5EF4-FFF2-40B4-BE49-F238E27FC236}">
-                <a16:creationId xmlns:a16="http://schemas.microsoft.com/office/drawing/2014/main" id="{19B7845B-0C43-CEC9-8729-8CA6E51BFD48}"/>
-              </a:ext>
-            </a:extLst>
-          </p:cNvPr>
-          <p:cNvPicPr>
-            <a:picLocks noChangeAspect="1"/>
-          </p:cNvPicPr>
-          <p:nvPr/>
-        </p:nvPicPr>
-        <p:blipFill>
-          <a:blip r:embed="rId5"/>
-          <a:stretch>
-            <a:fillRect/>
-          </a:stretch>
-        </p:blipFill>
-        <p:spPr>
-          <a:xfrm>
-            <a:off x="4560915" y="3647667"/>
-            <a:ext cx="4457468" cy="2293318"/>
-          </a:xfrm>
-          <a:prstGeom prst="rect">
-            <a:avLst/>
-          </a:prstGeom>
-          <a:ln>
-            <a:solidFill>
-              <a:schemeClr val="tx1"/>
-            </a:solidFill>
-          </a:ln>
-        </p:spPr>
-      </p:pic>
-    </p:spTree>
-    <p:extLst>
-      <p:ext uri="{BB962C8B-B14F-4D97-AF65-F5344CB8AC3E}">
-        <p14:creationId xmlns:p14="http://schemas.microsoft.com/office/powerpoint/2010/main" val="3050248158"/>
-      </p:ext>
-    </p:extLst>
-  </p:cSld>
-  <p:clrMapOvr>
-    <a:masterClrMapping/>
-  </p:clrMapOvr>
-  <p:timing>
-    <p:tnLst>
-      <p:par>
-        <p:cTn id="1" dur="indefinite" restart="never" nodeType="tmRoot">
-          <p:childTnLst>
-            <p:seq concurrent="1" nextAc="seek">
-              <p:cTn id="2" dur="indefinite" nodeType="mainSeq">
-                <p:childTnLst>
-                  <p:par>
-                    <p:cTn id="3" fill="hold">
-                      <p:stCondLst>
-                        <p:cond delay="indefinite"/>
-                      </p:stCondLst>
-                      <p:childTnLst>
-                        <p:par>
-                          <p:cTn id="4" fill="hold">
-                            <p:stCondLst>
-                              <p:cond delay="0"/>
-                            </p:stCondLst>
-                            <p:childTnLst>
-                              <p:par>
-                                <p:cTn id="5" presetID="1" presetClass="entr" presetSubtype="0" fill="hold" nodeType="clickEffect">
-                                  <p:stCondLst>
-                                    <p:cond delay="0"/>
-                                  </p:stCondLst>
-                                  <p:childTnLst>
-                                    <p:set>
-                                      <p:cBhvr>
-                                        <p:cTn id="6" dur="1" fill="hold">
-                                          <p:stCondLst>
-                                            <p:cond delay="0"/>
-                                          </p:stCondLst>
-                                        </p:cTn>
-                                        <p:tgtEl>
-                                          <p:spTgt spid="5"/>
-                                        </p:tgtEl>
-                                        <p:attrNameLst>
-                                          <p:attrName>style.visibility</p:attrName>
-                                        </p:attrNameLst>
-                                      </p:cBhvr>
-                                      <p:to>
-                                        <p:strVal val="visible"/>
-                                      </p:to>
-                                    </p:set>
-                                  </p:childTnLst>
-                                </p:cTn>
-                              </p:par>
-                            </p:childTnLst>
-                          </p:cTn>
-                        </p:par>
-                      </p:childTnLst>
-                    </p:cTn>
-                  </p:par>
-                </p:childTnLst>
-              </p:cTn>
-              <p:prevCondLst>
-                <p:cond evt="onPrev" delay="0">
-                  <p:tgtEl>
-                    <p:sldTgt/>
-                  </p:tgtEl>
-                </p:cond>
-              </p:prevCondLst>
-              <p:nextCondLst>
-                <p:cond evt="onNext" delay="0">
-                  <p:tgtEl>
-                    <p:sldTgt/>
-                  </p:tgtEl>
-                </p:cond>
-              </p:nextCondLst>
-            </p:seq>
-          </p:childTnLst>
-        </p:cTn>
-      </p:par>
-    </p:tnLst>
-  </p:timing>
-</p:sld>
-</file>
-
-<file path=ppt/slides/slide11.xml><?xml version="1.0" encoding="utf-8"?>
-<p:sld xmlns:a="http://schemas.openxmlformats.org/drawingml/2006/main" xmlns:r="http://schemas.openxmlformats.org/officeDocument/2006/relationships" xmlns:p="http://schemas.openxmlformats.org/presentationml/2006/main">
-  <p:cSld>
-    <p:spTree>
-      <p:nvGrpSpPr>
         <p:cNvPr id="1" name="Shape 112"/>
         <p:cNvGrpSpPr/>
         <p:nvPr/>
@@ -21710,7 +21822,7 @@
 </p:sld>
 </file>
 
-<file path=ppt/slides/slide12.xml><?xml version="1.0" encoding="utf-8"?>
+<file path=ppt/slides/slide11.xml><?xml version="1.0" encoding="utf-8"?>
 <p:sld xmlns:a="http://schemas.openxmlformats.org/drawingml/2006/main" xmlns:r="http://schemas.openxmlformats.org/officeDocument/2006/relationships" xmlns:p="http://schemas.openxmlformats.org/presentationml/2006/main">
   <p:cSld>
     <p:spTree>
@@ -23191,7 +23303,7 @@
 </p:sld>
 </file>
 
-<file path=ppt/slides/slide13.xml><?xml version="1.0" encoding="utf-8"?>
+<file path=ppt/slides/slide12.xml><?xml version="1.0" encoding="utf-8"?>
 <p:sld xmlns:a="http://schemas.openxmlformats.org/drawingml/2006/main" xmlns:r="http://schemas.openxmlformats.org/officeDocument/2006/relationships" xmlns:p="http://schemas.openxmlformats.org/presentationml/2006/main">
   <p:cSld>
     <p:spTree>
@@ -24063,7 +24175,7 @@
 </p:sld>
 </file>
 
-<file path=ppt/slides/slide14.xml><?xml version="1.0" encoding="utf-8"?>
+<file path=ppt/slides/slide13.xml><?xml version="1.0" encoding="utf-8"?>
 <p:sld xmlns:a="http://schemas.openxmlformats.org/drawingml/2006/main" xmlns:r="http://schemas.openxmlformats.org/officeDocument/2006/relationships" xmlns:p="http://schemas.openxmlformats.org/presentationml/2006/main">
   <p:cSld>
     <p:spTree>
@@ -24278,7 +24390,7 @@
 </p:sld>
 </file>
 
-<file path=ppt/slides/slide15.xml><?xml version="1.0" encoding="utf-8"?>
+<file path=ppt/slides/slide14.xml><?xml version="1.0" encoding="utf-8"?>
 <p:sld xmlns:a="http://schemas.openxmlformats.org/drawingml/2006/main" xmlns:r="http://schemas.openxmlformats.org/officeDocument/2006/relationships" xmlns:p="http://schemas.openxmlformats.org/presentationml/2006/main">
   <p:cSld>
     <p:spTree>
@@ -24826,7 +24938,7 @@
 </p:sld>
 </file>
 
-<file path=ppt/slides/slide16.xml><?xml version="1.0" encoding="utf-8"?>
+<file path=ppt/slides/slide15.xml><?xml version="1.0" encoding="utf-8"?>
 <p:sld xmlns:a="http://schemas.openxmlformats.org/drawingml/2006/main" xmlns:r="http://schemas.openxmlformats.org/officeDocument/2006/relationships" xmlns:p="http://schemas.openxmlformats.org/presentationml/2006/main">
   <p:cSld>
     <p:spTree>
@@ -25553,7 +25665,7 @@
 </p:sld>
 </file>
 
-<file path=ppt/slides/slide17.xml><?xml version="1.0" encoding="utf-8"?>
+<file path=ppt/slides/slide16.xml><?xml version="1.0" encoding="utf-8"?>
 <p:sld xmlns:a="http://schemas.openxmlformats.org/drawingml/2006/main" xmlns:r="http://schemas.openxmlformats.org/officeDocument/2006/relationships" xmlns:p="http://schemas.openxmlformats.org/presentationml/2006/main">
   <p:cSld>
     <p:spTree>
@@ -25812,7 +25924,7 @@
 </p:sld>
 </file>
 
-<file path=ppt/slides/slide18.xml><?xml version="1.0" encoding="utf-8"?>
+<file path=ppt/slides/slide17.xml><?xml version="1.0" encoding="utf-8"?>
 <p:sld xmlns:a="http://schemas.openxmlformats.org/drawingml/2006/main" xmlns:r="http://schemas.openxmlformats.org/officeDocument/2006/relationships" xmlns:p="http://schemas.openxmlformats.org/presentationml/2006/main">
   <p:cSld>
     <p:spTree>
@@ -26819,7 +26931,7 @@
 </p:sld>
 </file>
 
-<file path=ppt/slides/slide19.xml><?xml version="1.0" encoding="utf-8"?>
+<file path=ppt/slides/slide18.xml><?xml version="1.0" encoding="utf-8"?>
 <p:sld xmlns:a="http://schemas.openxmlformats.org/drawingml/2006/main" xmlns:r="http://schemas.openxmlformats.org/officeDocument/2006/relationships" xmlns:p="http://schemas.openxmlformats.org/presentationml/2006/main">
   <p:cSld>
     <p:spTree>
@@ -26923,7 +27035,7 @@
                 <a:latin typeface="Calibri"/>
                 <a:cs typeface="Calibri"/>
               </a:rPr>
-              <a:t>Abstraction – Write and test modular code</a:t>
+              <a:t>Abstraction and Testing</a:t>
             </a:r>
           </a:p>
           <a:p>
@@ -26941,7 +27053,7 @@
                 <a:latin typeface="Calibri"/>
                 <a:cs typeface="Calibri"/>
               </a:rPr>
-              <a:t>Automation – Script and test workflows with little intervention</a:t>
+              <a:t>Automation and Testing</a:t>
             </a:r>
           </a:p>
           <a:p>
@@ -26992,7 +27104,7 @@
                 <a:latin typeface="Calibri"/>
                 <a:cs typeface="Calibri"/>
               </a:rPr>
-              <a:t>WRDS</a:t>
+              <a:t>Wharton Research Data Services (WRDS)</a:t>
             </a:r>
           </a:p>
           <a:p>
@@ -27010,8 +27122,9 @@
                 <a:latin typeface="Calibri"/>
                 <a:cs typeface="Calibri"/>
               </a:rPr>
-              <a:t>Demand Estimation Models</a:t>
-            </a:r>
+              <a:t>Discrete Choice Demand Models</a:t>
+            </a:r>
+            <a:endParaRPr lang="en-US" dirty="0"/>
           </a:p>
           <a:p>
             <a:pPr marL="114300" indent="0">
@@ -27028,7 +27141,7 @@
                 <a:latin typeface="Calibri"/>
                 <a:cs typeface="Calibri"/>
               </a:rPr>
-              <a:t>Qualtrics</a:t>
+              <a:t>High Dimensional Fixed Effects</a:t>
             </a:r>
           </a:p>
           <a:p>
@@ -27046,7 +27159,7 @@
                 <a:latin typeface="Calibri"/>
                 <a:cs typeface="Calibri"/>
               </a:rPr>
-              <a:t>High Dimensional Models</a:t>
+              <a:t>Managing Qualtrics Data</a:t>
             </a:r>
             <a:endParaRPr lang="en-US" dirty="0"/>
           </a:p>
@@ -27137,176 +27250,7 @@
 </p:sld>
 </file>
 
-<file path=ppt/slides/slide2.xml><?xml version="1.0" encoding="utf-8"?>
-<p:sld xmlns:a="http://schemas.openxmlformats.org/drawingml/2006/main" xmlns:r="http://schemas.openxmlformats.org/officeDocument/2006/relationships" xmlns:p="http://schemas.openxmlformats.org/presentationml/2006/main">
-  <p:cSld>
-    <p:spTree>
-      <p:nvGrpSpPr>
-        <p:cNvPr id="1" name=""/>
-        <p:cNvGrpSpPr/>
-        <p:nvPr/>
-      </p:nvGrpSpPr>
-      <p:grpSpPr>
-        <a:xfrm>
-          <a:off x="0" y="0"/>
-          <a:ext cx="0" cy="0"/>
-          <a:chOff x="0" y="0"/>
-          <a:chExt cx="0" cy="0"/>
-        </a:xfrm>
-      </p:grpSpPr>
-      <p:sp>
-        <p:nvSpPr>
-          <p:cNvPr id="2" name="Title 1">
-            <a:extLst>
-              <a:ext uri="{FF2B5EF4-FFF2-40B4-BE49-F238E27FC236}">
-                <a16:creationId xmlns:a16="http://schemas.microsoft.com/office/drawing/2014/main" id="{B7862AAB-75C5-01E8-7C83-F7CB14768AFA}"/>
-              </a:ext>
-            </a:extLst>
-          </p:cNvPr>
-          <p:cNvSpPr>
-            <a:spLocks noGrp="1"/>
-          </p:cNvSpPr>
-          <p:nvPr>
-            <p:ph type="title"/>
-          </p:nvPr>
-        </p:nvSpPr>
-        <p:spPr/>
-        <p:txBody>
-          <a:bodyPr/>
-          <a:lstStyle/>
-          <a:p>
-            <a:r>
-              <a:rPr lang="en-US"/>
-              <a:t>Previous Experience</a:t>
-            </a:r>
-          </a:p>
-        </p:txBody>
-      </p:sp>
-      <p:sp>
-        <p:nvSpPr>
-          <p:cNvPr id="3" name="Text Placeholder 2">
-            <a:extLst>
-              <a:ext uri="{FF2B5EF4-FFF2-40B4-BE49-F238E27FC236}">
-                <a16:creationId xmlns:a16="http://schemas.microsoft.com/office/drawing/2014/main" id="{838492E3-91C7-FA09-1EED-65C4220C1E22}"/>
-              </a:ext>
-            </a:extLst>
-          </p:cNvPr>
-          <p:cNvSpPr>
-            <a:spLocks noGrp="1"/>
-          </p:cNvSpPr>
-          <p:nvPr>
-            <p:ph type="body" idx="1"/>
-          </p:nvPr>
-        </p:nvSpPr>
-        <p:spPr/>
-        <p:txBody>
-          <a:bodyPr/>
-          <a:lstStyle/>
-          <a:p>
-            <a:pPr>
-              <a:lnSpc>
-                <a:spcPct val="90000"/>
-              </a:lnSpc>
-              <a:spcBef>
-                <a:spcPts val="1000"/>
-              </a:spcBef>
-            </a:pPr>
-            <a:r>
-              <a:rPr lang="en-US" dirty="0">
-                <a:latin typeface="Calibri"/>
-                <a:cs typeface="Calibri"/>
-              </a:rPr>
-              <a:t>What programming languages do you use?</a:t>
-            </a:r>
-            <a:endParaRPr lang="en-US" dirty="0"/>
-          </a:p>
-          <a:p>
-            <a:pPr>
-              <a:lnSpc>
-                <a:spcPct val="90000"/>
-              </a:lnSpc>
-              <a:spcBef>
-                <a:spcPts val="1000"/>
-              </a:spcBef>
-            </a:pPr>
-            <a:endParaRPr lang="en-US">
-              <a:latin typeface="Calibri"/>
-              <a:cs typeface="Calibri"/>
-            </a:endParaRPr>
-          </a:p>
-          <a:p>
-            <a:pPr>
-              <a:lnSpc>
-                <a:spcPct val="90000"/>
-              </a:lnSpc>
-              <a:spcBef>
-                <a:spcPts val="1000"/>
-              </a:spcBef>
-            </a:pPr>
-            <a:endParaRPr lang="en-US"/>
-          </a:p>
-          <a:p>
-            <a:pPr>
-              <a:lnSpc>
-                <a:spcPct val="90000"/>
-              </a:lnSpc>
-              <a:spcBef>
-                <a:spcPts val="1000"/>
-              </a:spcBef>
-            </a:pPr>
-            <a:r>
-              <a:rPr lang="en-US" dirty="0">
-                <a:latin typeface="Calibri"/>
-                <a:cs typeface="Calibri"/>
-              </a:rPr>
-              <a:t>What do you find difficult about replicating others' work?</a:t>
-            </a:r>
-            <a:endParaRPr lang="en-US" dirty="0"/>
-          </a:p>
-        </p:txBody>
-      </p:sp>
-      <p:sp>
-        <p:nvSpPr>
-          <p:cNvPr id="4" name="Footer Placeholder 3">
-            <a:extLst>
-              <a:ext uri="{FF2B5EF4-FFF2-40B4-BE49-F238E27FC236}">
-                <a16:creationId xmlns:a16="http://schemas.microsoft.com/office/drawing/2014/main" id="{F6ADA871-9FF6-D0AE-77F4-9966318D598E}"/>
-              </a:ext>
-            </a:extLst>
-          </p:cNvPr>
-          <p:cNvSpPr>
-            <a:spLocks noGrp="1"/>
-          </p:cNvSpPr>
-          <p:nvPr>
-            <p:ph type="ftr" idx="11"/>
-          </p:nvPr>
-        </p:nvSpPr>
-        <p:spPr/>
-        <p:txBody>
-          <a:bodyPr/>
-          <a:lstStyle/>
-          <a:p>
-            <a:r>
-              <a:rPr lang="en-US"/>
-              <a:t>Reproducibility Principles</a:t>
-            </a:r>
-          </a:p>
-        </p:txBody>
-      </p:sp>
-    </p:spTree>
-    <p:extLst>
-      <p:ext uri="{BB962C8B-B14F-4D97-AF65-F5344CB8AC3E}">
-        <p14:creationId xmlns:p14="http://schemas.microsoft.com/office/powerpoint/2010/main" val="60139911"/>
-      </p:ext>
-    </p:extLst>
-  </p:cSld>
-  <p:clrMapOvr>
-    <a:masterClrMapping/>
-  </p:clrMapOvr>
-</p:sld>
-</file>
-
-<file path=ppt/slides/slide20.xml><?xml version="1.0" encoding="utf-8"?>
+<file path=ppt/slides/slide19.xml><?xml version="1.0" encoding="utf-8"?>
 <p:sld xmlns:a="http://schemas.openxmlformats.org/drawingml/2006/main" xmlns:r="http://schemas.openxmlformats.org/officeDocument/2006/relationships" xmlns:p="http://schemas.openxmlformats.org/presentationml/2006/main">
   <p:cSld>
     <p:spTree>
@@ -27358,14 +27302,14 @@
               <a:buNone/>
             </a:pPr>
             <a:r>
-              <a:rPr lang="en-US" sz="4000">
+              <a:rPr lang="en-US" sz="4000" dirty="0">
                 <a:solidFill>
                   <a:schemeClr val="bg1"/>
                 </a:solidFill>
               </a:rPr>
-              <a:t>Break</a:t>
-            </a:r>
-            <a:endParaRPr lang="en-US"/>
+              <a:t>KLC Demonstration</a:t>
+            </a:r>
+            <a:endParaRPr lang="en-US" dirty="0"/>
           </a:p>
         </p:txBody>
       </p:sp>
@@ -27410,7 +27354,176 @@
 </p:sld>
 </file>
 
-<file path=ppt/slides/slide21.xml><?xml version="1.0" encoding="utf-8"?>
+<file path=ppt/slides/slide2.xml><?xml version="1.0" encoding="utf-8"?>
+<p:sld xmlns:a="http://schemas.openxmlformats.org/drawingml/2006/main" xmlns:r="http://schemas.openxmlformats.org/officeDocument/2006/relationships" xmlns:p="http://schemas.openxmlformats.org/presentationml/2006/main" show="0">
+  <p:cSld>
+    <p:spTree>
+      <p:nvGrpSpPr>
+        <p:cNvPr id="1" name=""/>
+        <p:cNvGrpSpPr/>
+        <p:nvPr/>
+      </p:nvGrpSpPr>
+      <p:grpSpPr>
+        <a:xfrm>
+          <a:off x="0" y="0"/>
+          <a:ext cx="0" cy="0"/>
+          <a:chOff x="0" y="0"/>
+          <a:chExt cx="0" cy="0"/>
+        </a:xfrm>
+      </p:grpSpPr>
+      <p:sp>
+        <p:nvSpPr>
+          <p:cNvPr id="2" name="Title 1">
+            <a:extLst>
+              <a:ext uri="{FF2B5EF4-FFF2-40B4-BE49-F238E27FC236}">
+                <a16:creationId xmlns:a16="http://schemas.microsoft.com/office/drawing/2014/main" id="{B7862AAB-75C5-01E8-7C83-F7CB14768AFA}"/>
+              </a:ext>
+            </a:extLst>
+          </p:cNvPr>
+          <p:cNvSpPr>
+            <a:spLocks noGrp="1"/>
+          </p:cNvSpPr>
+          <p:nvPr>
+            <p:ph type="title"/>
+          </p:nvPr>
+        </p:nvSpPr>
+        <p:spPr/>
+        <p:txBody>
+          <a:bodyPr/>
+          <a:lstStyle/>
+          <a:p>
+            <a:r>
+              <a:rPr lang="en-US"/>
+              <a:t>Previous Experience</a:t>
+            </a:r>
+          </a:p>
+        </p:txBody>
+      </p:sp>
+      <p:sp>
+        <p:nvSpPr>
+          <p:cNvPr id="3" name="Text Placeholder 2">
+            <a:extLst>
+              <a:ext uri="{FF2B5EF4-FFF2-40B4-BE49-F238E27FC236}">
+                <a16:creationId xmlns:a16="http://schemas.microsoft.com/office/drawing/2014/main" id="{838492E3-91C7-FA09-1EED-65C4220C1E22}"/>
+              </a:ext>
+            </a:extLst>
+          </p:cNvPr>
+          <p:cNvSpPr>
+            <a:spLocks noGrp="1"/>
+          </p:cNvSpPr>
+          <p:nvPr>
+            <p:ph type="body" idx="1"/>
+          </p:nvPr>
+        </p:nvSpPr>
+        <p:spPr/>
+        <p:txBody>
+          <a:bodyPr/>
+          <a:lstStyle/>
+          <a:p>
+            <a:pPr>
+              <a:lnSpc>
+                <a:spcPct val="90000"/>
+              </a:lnSpc>
+              <a:spcBef>
+                <a:spcPts val="1000"/>
+              </a:spcBef>
+            </a:pPr>
+            <a:r>
+              <a:rPr lang="en-US" dirty="0">
+                <a:latin typeface="Calibri"/>
+                <a:cs typeface="Calibri"/>
+              </a:rPr>
+              <a:t>What programming languages do you use?</a:t>
+            </a:r>
+            <a:endParaRPr lang="en-US" dirty="0"/>
+          </a:p>
+          <a:p>
+            <a:pPr>
+              <a:lnSpc>
+                <a:spcPct val="90000"/>
+              </a:lnSpc>
+              <a:spcBef>
+                <a:spcPts val="1000"/>
+              </a:spcBef>
+            </a:pPr>
+            <a:endParaRPr lang="en-US">
+              <a:latin typeface="Calibri"/>
+              <a:cs typeface="Calibri"/>
+            </a:endParaRPr>
+          </a:p>
+          <a:p>
+            <a:pPr>
+              <a:lnSpc>
+                <a:spcPct val="90000"/>
+              </a:lnSpc>
+              <a:spcBef>
+                <a:spcPts val="1000"/>
+              </a:spcBef>
+            </a:pPr>
+            <a:endParaRPr lang="en-US"/>
+          </a:p>
+          <a:p>
+            <a:pPr>
+              <a:lnSpc>
+                <a:spcPct val="90000"/>
+              </a:lnSpc>
+              <a:spcBef>
+                <a:spcPts val="1000"/>
+              </a:spcBef>
+            </a:pPr>
+            <a:r>
+              <a:rPr lang="en-US" dirty="0">
+                <a:latin typeface="Calibri"/>
+                <a:cs typeface="Calibri"/>
+              </a:rPr>
+              <a:t>What do you find difficult about replicating others' work?</a:t>
+            </a:r>
+            <a:endParaRPr lang="en-US" dirty="0"/>
+          </a:p>
+        </p:txBody>
+      </p:sp>
+      <p:sp>
+        <p:nvSpPr>
+          <p:cNvPr id="4" name="Footer Placeholder 3">
+            <a:extLst>
+              <a:ext uri="{FF2B5EF4-FFF2-40B4-BE49-F238E27FC236}">
+                <a16:creationId xmlns:a16="http://schemas.microsoft.com/office/drawing/2014/main" id="{F6ADA871-9FF6-D0AE-77F4-9966318D598E}"/>
+              </a:ext>
+            </a:extLst>
+          </p:cNvPr>
+          <p:cNvSpPr>
+            <a:spLocks noGrp="1"/>
+          </p:cNvSpPr>
+          <p:nvPr>
+            <p:ph type="ftr" idx="11"/>
+          </p:nvPr>
+        </p:nvSpPr>
+        <p:spPr/>
+        <p:txBody>
+          <a:bodyPr/>
+          <a:lstStyle/>
+          <a:p>
+            <a:r>
+              <a:rPr lang="en-US"/>
+              <a:t>Reproducibility Principles</a:t>
+            </a:r>
+          </a:p>
+        </p:txBody>
+      </p:sp>
+    </p:spTree>
+    <p:extLst>
+      <p:ext uri="{BB962C8B-B14F-4D97-AF65-F5344CB8AC3E}">
+        <p14:creationId xmlns:p14="http://schemas.microsoft.com/office/powerpoint/2010/main" val="60139911"/>
+      </p:ext>
+    </p:extLst>
+  </p:cSld>
+  <p:clrMapOvr>
+    <a:masterClrMapping/>
+  </p:clrMapOvr>
+</p:sld>
+</file>
+
+<file path=ppt/slides/slide20.xml><?xml version="1.0" encoding="utf-8"?>
 <p:sld xmlns:a="http://schemas.openxmlformats.org/drawingml/2006/main" xmlns:r="http://schemas.openxmlformats.org/officeDocument/2006/relationships" xmlns:p="http://schemas.openxmlformats.org/presentationml/2006/main">
   <p:cSld>
     <p:spTree>
@@ -27772,7 +27885,7 @@
 </p:sld>
 </file>
 
-<file path=ppt/slides/slide3.xml><?xml version="1.0" encoding="utf-8"?>
+<file path=ppt/slides/slide21.xml><?xml version="1.0" encoding="utf-8"?>
 <p:sld xmlns:a="http://schemas.openxmlformats.org/drawingml/2006/main" xmlns:r="http://schemas.openxmlformats.org/officeDocument/2006/relationships" xmlns:p="http://schemas.openxmlformats.org/presentationml/2006/main">
   <p:cSld>
     <p:spTree>
@@ -27791,10 +27904,38 @@
       </p:grpSpPr>
       <p:sp>
         <p:nvSpPr>
+          <p:cNvPr id="2" name="Title 1">
+            <a:extLst>
+              <a:ext uri="{FF2B5EF4-FFF2-40B4-BE49-F238E27FC236}">
+                <a16:creationId xmlns:a16="http://schemas.microsoft.com/office/drawing/2014/main" id="{C4BF0530-28B5-4EC9-E9E0-D1D757CFB9C1}"/>
+              </a:ext>
+            </a:extLst>
+          </p:cNvPr>
+          <p:cNvSpPr>
+            <a:spLocks noGrp="1"/>
+          </p:cNvSpPr>
+          <p:nvPr>
+            <p:ph type="title"/>
+          </p:nvPr>
+        </p:nvSpPr>
+        <p:spPr/>
+        <p:txBody>
+          <a:bodyPr/>
+          <a:lstStyle/>
+          <a:p>
+            <a:r>
+              <a:rPr lang="en-US" dirty="0"/>
+              <a:t>Common KLC Tasks</a:t>
+            </a:r>
+          </a:p>
+        </p:txBody>
+      </p:sp>
+      <p:sp>
+        <p:nvSpPr>
           <p:cNvPr id="3" name="Text Placeholder 2">
             <a:extLst>
               <a:ext uri="{FF2B5EF4-FFF2-40B4-BE49-F238E27FC236}">
-                <a16:creationId xmlns:a16="http://schemas.microsoft.com/office/drawing/2014/main" id="{EC9AA3F7-FC6E-575A-F3F6-82A49486401E}"/>
+                <a16:creationId xmlns:a16="http://schemas.microsoft.com/office/drawing/2014/main" id="{7CF0DC16-F44C-1676-75DB-1343A1ECFA0A}"/>
               </a:ext>
             </a:extLst>
           </p:cNvPr>
@@ -27805,37 +27946,68 @@
             <p:ph type="body" idx="1"/>
           </p:nvPr>
         </p:nvSpPr>
-        <p:spPr>
-          <a:xfrm>
-            <a:off x="-1700" y="-1335"/>
-            <a:ext cx="9147399" cy="6514527"/>
-          </a:xfrm>
-          <a:solidFill>
-            <a:srgbClr val="7030A0"/>
-          </a:solidFill>
-        </p:spPr>
+        <p:spPr/>
         <p:txBody>
-          <a:bodyPr spcFirstLastPara="1" wrap="square" lIns="91425" tIns="45700" rIns="91425" bIns="45700" anchor="ctr" anchorCtr="0">
-            <a:noAutofit/>
-          </a:bodyPr>
+          <a:bodyPr/>
           <a:lstStyle/>
           <a:p>
-            <a:pPr marL="114300" indent="0" algn="ctr">
-              <a:buNone/>
-            </a:pPr>
-            <a:r>
-              <a:rPr lang="en-US" sz="4000">
-                <a:solidFill>
-                  <a:schemeClr val="bg1"/>
-                </a:solidFill>
+            <a:r>
+              <a:rPr lang="en-US" dirty="0">
+                <a:hlinkClick r:id="rId3"/>
               </a:rPr>
-              <a:t>PART I – Replicability</a:t>
-            </a:r>
-            <a:endParaRPr lang="en-US">
-              <a:solidFill>
-                <a:schemeClr val="bg1"/>
-              </a:solidFill>
-            </a:endParaRPr>
+              <a:t>Kellogg Computing</a:t>
+            </a:r>
+          </a:p>
+          <a:p>
+            <a:r>
+              <a:rPr lang="en-US" dirty="0">
+                <a:hlinkClick r:id="rId4"/>
+              </a:rPr>
+              <a:t>Software Modules</a:t>
+            </a:r>
+            <a:endParaRPr lang="en-US" dirty="0"/>
+          </a:p>
+          <a:p>
+            <a:r>
+              <a:rPr lang="en-US" dirty="0"/>
+              <a:t>Open connections and start sessions</a:t>
+            </a:r>
+          </a:p>
+          <a:p>
+            <a:r>
+              <a:rPr lang="en-US" dirty="0"/>
+              <a:t>Transfer files to and from KLC</a:t>
+            </a:r>
+          </a:p>
+          <a:p>
+            <a:r>
+              <a:rPr lang="en-US" dirty="0"/>
+              <a:t>Open a terminal and use the shell</a:t>
+            </a:r>
+          </a:p>
+          <a:p>
+            <a:r>
+              <a:rPr lang="en-US" dirty="0"/>
+              <a:t>Use graphical tools for R, Stata, Python</a:t>
+            </a:r>
+          </a:p>
+          <a:p>
+            <a:r>
+              <a:rPr lang="en-US" dirty="0"/>
+              <a:t>Command line tools for R, Stata, Python</a:t>
+            </a:r>
+          </a:p>
+          <a:p>
+            <a:r>
+              <a:rPr lang="en-US" dirty="0"/>
+              <a:t>Clone and use Git repos</a:t>
+            </a:r>
+          </a:p>
+          <a:p>
+            <a:r>
+              <a:rPr lang="en-US" dirty="0"/>
+              <a:t>Create Conda environments (next workshop)</a:t>
+            </a:r>
           </a:p>
         </p:txBody>
       </p:sp>
@@ -27844,7 +28016,7 @@
           <p:cNvPr id="4" name="Footer Placeholder 3">
             <a:extLst>
               <a:ext uri="{FF2B5EF4-FFF2-40B4-BE49-F238E27FC236}">
-                <a16:creationId xmlns:a16="http://schemas.microsoft.com/office/drawing/2014/main" id="{5D6F9351-75F6-C7A1-4564-32139E3FB6F5}"/>
+                <a16:creationId xmlns:a16="http://schemas.microsoft.com/office/drawing/2014/main" id="{392EFBDF-5CFF-AD8F-2F4F-7F9834E22FF3}"/>
               </a:ext>
             </a:extLst>
           </p:cNvPr>
@@ -27870,7 +28042,7 @@
     </p:spTree>
     <p:extLst>
       <p:ext uri="{BB962C8B-B14F-4D97-AF65-F5344CB8AC3E}">
-        <p14:creationId xmlns:p14="http://schemas.microsoft.com/office/powerpoint/2010/main" val="3056279571"/>
+        <p14:creationId xmlns:p14="http://schemas.microsoft.com/office/powerpoint/2010/main" val="1335714563"/>
       </p:ext>
     </p:extLst>
   </p:cSld>
@@ -27880,7 +28052,7 @@
 </p:sld>
 </file>
 
-<file path=ppt/slides/slide4.xml><?xml version="1.0" encoding="utf-8"?>
+<file path=ppt/slides/slide3.xml><?xml version="1.0" encoding="utf-8"?>
 <p:sld xmlns:a="http://schemas.openxmlformats.org/drawingml/2006/main" xmlns:r="http://schemas.openxmlformats.org/officeDocument/2006/relationships" xmlns:p="http://schemas.openxmlformats.org/presentationml/2006/main">
   <p:cSld>
     <p:spTree>
@@ -28013,29 +28185,22 @@
           <a:lstStyle/>
           <a:p>
             <a:r>
-              <a:rPr lang="en-US" sz="1800">
+              <a:rPr lang="en-US" sz="1800" dirty="0">
                 <a:solidFill>
                   <a:schemeClr val="dk1"/>
                 </a:solidFill>
               </a:rPr>
               <a:t>Co-authors and RAs</a:t>
             </a:r>
-            <a:endParaRPr lang="en-US">
+            <a:endParaRPr lang="en-US" dirty="0">
               <a:solidFill>
                 <a:schemeClr val="dk1"/>
               </a:solidFill>
             </a:endParaRPr>
           </a:p>
           <a:p>
-            <a:endParaRPr lang="en-US" sz="1800">
-              <a:solidFill>
-                <a:schemeClr val="dk1"/>
-              </a:solidFill>
-            </a:endParaRPr>
-          </a:p>
-          <a:p>
-            <a:r>
-              <a:rPr lang="en-US" sz="1800">
+            <a:r>
+              <a:rPr lang="en-US" sz="1800" dirty="0">
                 <a:solidFill>
                   <a:schemeClr val="dk1"/>
                 </a:solidFill>
@@ -28045,14 +28210,14 @@
           </a:p>
           <a:p>
             <a:r>
-              <a:rPr lang="en-US" sz="1800">
+              <a:rPr lang="en-US" sz="1800" dirty="0">
                 <a:solidFill>
                   <a:schemeClr val="dk1"/>
                 </a:solidFill>
               </a:rPr>
               <a:t>Readers of your paper</a:t>
             </a:r>
-            <a:endParaRPr lang="en-US">
+            <a:endParaRPr lang="en-US" dirty="0">
               <a:solidFill>
                 <a:schemeClr val="dk1"/>
               </a:solidFill>
@@ -28590,7 +28755,7 @@
 </p:sld>
 </file>
 
-<file path=ppt/slides/slide5.xml><?xml version="1.0" encoding="utf-8"?>
+<file path=ppt/slides/slide4.xml><?xml version="1.0" encoding="utf-8"?>
 <p:sld xmlns:a="http://schemas.openxmlformats.org/drawingml/2006/main" xmlns:r="http://schemas.openxmlformats.org/officeDocument/2006/relationships" xmlns:p="http://schemas.openxmlformats.org/presentationml/2006/main">
   <p:cSld>
     <p:spTree>
@@ -28719,7 +28884,7 @@
           <a:lstStyle/>
           <a:p>
             <a:r>
-              <a:rPr lang="en-US" sz="1800">
+              <a:rPr lang="en-US" sz="1800" dirty="0">
                 <a:solidFill>
                   <a:schemeClr val="dk1"/>
                 </a:solidFill>
@@ -28736,14 +28901,14 @@
           </a:p>
           <a:p>
             <a:r>
-              <a:rPr lang="en-US" sz="1800">
+              <a:rPr lang="en-US" sz="1800" dirty="0">
                 <a:solidFill>
                   <a:schemeClr val="dk1"/>
                 </a:solidFill>
               </a:rPr>
-              <a:t>You and will need to…</a:t>
-            </a:r>
-            <a:endParaRPr sz="1800">
+              <a:t>You will need to…</a:t>
+            </a:r>
+            <a:endParaRPr sz="1800" dirty="0">
               <a:solidFill>
                 <a:schemeClr val="dk1"/>
               </a:solidFill>
@@ -28777,13 +28942,18 @@
               <a:buChar char="●"/>
             </a:pPr>
             <a:r>
-              <a:rPr lang="en-US" sz="1800">
+              <a:rPr lang="en-US" sz="1800" dirty="0">
                 <a:solidFill>
                   <a:schemeClr val="dk1"/>
                 </a:solidFill>
               </a:rPr>
-              <a:t>… deploy multiple versions of your survey</a:t>
-            </a:r>
+              <a:t>… collect raw data in different stages and merge them correctly</a:t>
+            </a:r>
+            <a:endParaRPr lang="en-US" dirty="0">
+              <a:solidFill>
+                <a:schemeClr val="dk1"/>
+              </a:solidFill>
+            </a:endParaRPr>
           </a:p>
           <a:p>
             <a:pPr marL="914400" indent="-342900">
@@ -28794,14 +28964,31 @@
               <a:buChar char="●"/>
             </a:pPr>
             <a:r>
-              <a:rPr lang="en-US" sz="1800">
+              <a:rPr lang="en-US" sz="1800" dirty="0">
                 <a:solidFill>
                   <a:schemeClr val="dk1"/>
                 </a:solidFill>
               </a:rPr>
-              <a:t>… collect multiple waves of survey data and merge them correctly</a:t>
-            </a:r>
-            <a:endParaRPr lang="en-US">
+              <a:t>… manage different version of your raw data</a:t>
+            </a:r>
+          </a:p>
+          <a:p>
+            <a:pPr marL="914400" indent="-342900">
+              <a:buClr>
+                <a:schemeClr val="dk1"/>
+              </a:buClr>
+              <a:buSzPts val="1800"/>
+              <a:buChar char="●"/>
+            </a:pPr>
+            <a:r>
+              <a:rPr lang="en-US" sz="1800" dirty="0">
+                <a:solidFill>
+                  <a:schemeClr val="dk1"/>
+                </a:solidFill>
+              </a:rPr>
+              <a:t>… "clean up" the raw data</a:t>
+            </a:r>
+            <a:endParaRPr lang="en-US" dirty="0">
               <a:solidFill>
                 <a:schemeClr val="dk1"/>
               </a:solidFill>
@@ -28813,38 +29000,24 @@
                 <a:schemeClr val="dk1"/>
               </a:buClr>
               <a:buSzPts val="1800"/>
+              <a:buFont typeface="Arial"/>
               <a:buChar char="●"/>
             </a:pPr>
             <a:r>
-              <a:rPr lang="en-US" sz="1800">
+              <a:rPr lang="en-US" sz="1800" dirty="0">
                 <a:solidFill>
                   <a:schemeClr val="dk1"/>
                 </a:solidFill>
               </a:rPr>
-              <a:t>… take steps to "clean" the raw data</a:t>
-            </a:r>
-            <a:endParaRPr lang="en-US">
-              <a:solidFill>
-                <a:schemeClr val="dk1"/>
-              </a:solidFill>
-            </a:endParaRPr>
-          </a:p>
-          <a:p>
-            <a:pPr marL="914400" indent="-342900">
-              <a:buClr>
-                <a:schemeClr val="dk1"/>
-              </a:buClr>
-              <a:buSzPts val="1800"/>
-              <a:buFont typeface="Arial"/>
-              <a:buChar char="●"/>
-            </a:pPr>
-            <a:r>
-              <a:rPr lang="en-US" sz="1800">
+              <a:t>… try different model specifications </a:t>
+            </a:r>
+            <a:r>
+              <a:rPr lang="en-US" sz="1800" dirty="0" err="1">
                 <a:solidFill>
                   <a:schemeClr val="dk1"/>
                 </a:solidFill>
               </a:rPr>
-              <a:t>… try out multiple regression specifications</a:t>
+              <a:t>specifications</a:t>
             </a:r>
           </a:p>
           <a:p>
@@ -28857,7 +29030,7 @@
               <a:buChar char="●"/>
             </a:pPr>
             <a:r>
-              <a:rPr lang="en-US" sz="1800">
+              <a:rPr lang="en-US" sz="1800" dirty="0">
                 <a:solidFill>
                   <a:schemeClr val="dk1"/>
                 </a:solidFill>
@@ -28875,7 +29048,7 @@
               <a:buChar char="●"/>
             </a:pPr>
             <a:r>
-              <a:rPr lang="en-US" sz="1800">
+              <a:rPr lang="en-US" sz="1800" dirty="0">
                 <a:solidFill>
                   <a:schemeClr val="dk1"/>
                 </a:solidFill>
@@ -29632,7 +29805,7 @@
 </p:sld>
 </file>
 
-<file path=ppt/slides/slide6.xml><?xml version="1.0" encoding="utf-8"?>
+<file path=ppt/slides/slide5.xml><?xml version="1.0" encoding="utf-8"?>
 <p:sld xmlns:a="http://schemas.openxmlformats.org/drawingml/2006/main" xmlns:r="http://schemas.openxmlformats.org/officeDocument/2006/relationships" xmlns:p="http://schemas.openxmlformats.org/presentationml/2006/main">
   <p:cSld>
     <p:spTree>
@@ -29682,10 +29855,10 @@
               <a:buSzPts val="3200"/>
             </a:pPr>
             <a:r>
-              <a:rPr lang="en-US"/>
-              <a:t>Will You Collaborate Well With Yourself?</a:t>
-            </a:r>
-            <a:endParaRPr/>
+              <a:rPr lang="en-US" dirty="0"/>
+              <a:t>Will You Collaborate With Yourself Well?</a:t>
+            </a:r>
+            <a:endParaRPr dirty="0"/>
           </a:p>
         </p:txBody>
       </p:sp>
@@ -29748,7 +29921,7 @@
         <p:spPr>
           <a:xfrm>
             <a:off x="537882" y="1202823"/>
-            <a:ext cx="8305200" cy="1156720"/>
+            <a:ext cx="8434408" cy="1156720"/>
           </a:xfrm>
           <a:prstGeom prst="rect">
             <a:avLst/>
@@ -29770,7 +29943,7 @@
                   <a:schemeClr val="dk1"/>
                 </a:solidFill>
               </a:rPr>
-              <a:t>10 years from now, will you be able to recreate every result from the paper you are currently writing?</a:t>
+              <a:t>In 2033, will you be able to recreate all results from a paper you are writing now?</a:t>
             </a:r>
             <a:endParaRPr lang="en-US" dirty="0">
               <a:solidFill>
@@ -30104,7 +30277,7 @@
                   <a:schemeClr val="dk1"/>
                 </a:solidFill>
               </a:rPr>
-              <a:t>        - and working code that will verify your results? </a:t>
+              <a:t>        - and working code that verifies your results? </a:t>
             </a:r>
           </a:p>
           <a:p>
@@ -30161,14 +30334,14 @@
           <a:lstStyle/>
           <a:p>
             <a:r>
-              <a:rPr lang="en-US" sz="1800">
+              <a:rPr lang="en-US" sz="1800" dirty="0">
                 <a:solidFill>
                   <a:schemeClr val="dk1"/>
                 </a:solidFill>
               </a:rPr>
-              <a:t>Will you be prepared to replicate you own work after you leave Northwestern?</a:t>
-            </a:r>
-            <a:endParaRPr lang="en-US">
+              <a:t>Will you be able to answer questions about your own work after you leave Northwestern?</a:t>
+            </a:r>
+            <a:endParaRPr lang="en-US" dirty="0">
               <a:solidFill>
                 <a:schemeClr val="dk1"/>
               </a:solidFill>
@@ -30206,7 +30379,7 @@
         </p:blipFill>
         <p:spPr>
           <a:xfrm>
-            <a:off x="3201090" y="4544310"/>
+            <a:off x="6401490" y="4683458"/>
             <a:ext cx="2743200" cy="1820108"/>
           </a:xfrm>
           <a:prstGeom prst="rect">
@@ -30362,6 +30535,51 @@
                       </p:childTnLst>
                     </p:cTn>
                   </p:par>
+                  <p:par>
+                    <p:cTn id="15" fill="hold">
+                      <p:stCondLst>
+                        <p:cond delay="indefinite"/>
+                      </p:stCondLst>
+                      <p:childTnLst>
+                        <p:par>
+                          <p:cTn id="16" fill="hold">
+                            <p:stCondLst>
+                              <p:cond delay="0"/>
+                            </p:stCondLst>
+                            <p:childTnLst>
+                              <p:par>
+                                <p:cTn id="17" presetID="1" presetClass="entr" presetSubtype="0" fill="hold" nodeType="clickEffect">
+                                  <p:stCondLst>
+                                    <p:cond delay="0"/>
+                                  </p:stCondLst>
+                                  <p:childTnLst>
+                                    <p:set>
+                                      <p:cBhvr>
+                                        <p:cTn id="18" dur="1" fill="hold">
+                                          <p:stCondLst>
+                                            <p:cond delay="0"/>
+                                          </p:stCondLst>
+                                        </p:cTn>
+                                        <p:tgtEl>
+                                          <p:spTgt spid="8"/>
+                                        </p:tgtEl>
+                                        <p:attrNameLst>
+                                          <p:attrName>style.visibility</p:attrName>
+                                        </p:attrNameLst>
+                                      </p:cBhvr>
+                                      <p:to>
+                                        <p:strVal val="visible"/>
+                                      </p:to>
+                                    </p:set>
+                                  </p:childTnLst>
+                                </p:cTn>
+                              </p:par>
+                            </p:childTnLst>
+                          </p:cTn>
+                        </p:par>
+                      </p:childTnLst>
+                    </p:cTn>
+                  </p:par>
                 </p:childTnLst>
               </p:cTn>
               <p:prevCondLst>
@@ -30392,7 +30610,7 @@
 </p:sld>
 </file>
 
-<file path=ppt/slides/slide7.xml><?xml version="1.0" encoding="utf-8"?>
+<file path=ppt/slides/slide6.xml><?xml version="1.0" encoding="utf-8"?>
 <p:sld xmlns:a="http://schemas.openxmlformats.org/drawingml/2006/main" xmlns:r="http://schemas.openxmlformats.org/officeDocument/2006/relationships" xmlns:p="http://schemas.openxmlformats.org/presentationml/2006/main">
   <p:cSld>
     <p:spTree>
@@ -30945,7 +31163,7 @@
 </p:sld>
 </file>
 
-<file path=ppt/slides/slide8.xml><?xml version="1.0" encoding="utf-8"?>
+<file path=ppt/slides/slide7.xml><?xml version="1.0" encoding="utf-8"?>
 <p:sld xmlns:a="http://schemas.openxmlformats.org/drawingml/2006/main" xmlns:r="http://schemas.openxmlformats.org/officeDocument/2006/relationships" xmlns:p="http://schemas.openxmlformats.org/presentationml/2006/main">
   <p:cSld>
     <p:spTree>
@@ -31343,6 +31561,273 @@
 </p:sld>
 </file>
 
+<file path=ppt/slides/slide8.xml><?xml version="1.0" encoding="utf-8"?>
+<p:sld xmlns:a="http://schemas.openxmlformats.org/drawingml/2006/main" xmlns:r="http://schemas.openxmlformats.org/officeDocument/2006/relationships" xmlns:p="http://schemas.openxmlformats.org/presentationml/2006/main">
+  <p:cSld>
+    <p:spTree>
+      <p:nvGrpSpPr>
+        <p:cNvPr id="1" name="Shape 175"/>
+        <p:cNvGrpSpPr/>
+        <p:nvPr/>
+      </p:nvGrpSpPr>
+      <p:grpSpPr>
+        <a:xfrm>
+          <a:off x="0" y="0"/>
+          <a:ext cx="0" cy="0"/>
+          <a:chOff x="0" y="0"/>
+          <a:chExt cx="0" cy="0"/>
+        </a:xfrm>
+      </p:grpSpPr>
+      <p:sp>
+        <p:nvSpPr>
+          <p:cNvPr id="176" name="Google Shape;176;p21"/>
+          <p:cNvSpPr txBox="1">
+            <a:spLocks noGrp="1"/>
+          </p:cNvSpPr>
+          <p:nvPr>
+            <p:ph type="title"/>
+          </p:nvPr>
+        </p:nvSpPr>
+        <p:spPr>
+          <a:xfrm>
+            <a:off x="457200" y="0"/>
+            <a:ext cx="8229600" cy="1143000"/>
+          </a:xfrm>
+          <a:prstGeom prst="rect">
+            <a:avLst/>
+          </a:prstGeom>
+          <a:noFill/>
+          <a:ln>
+            <a:noFill/>
+          </a:ln>
+        </p:spPr>
+        <p:txBody>
+          <a:bodyPr spcFirstLastPara="1" wrap="square" lIns="91425" tIns="45700" rIns="91425" bIns="45700" anchor="ctr" anchorCtr="0">
+            <a:noAutofit/>
+          </a:bodyPr>
+          <a:lstStyle/>
+          <a:p>
+            <a:pPr>
+              <a:buSzPts val="3200"/>
+            </a:pPr>
+            <a:r>
+              <a:rPr lang="en-US"/>
+              <a:t>Automation Opportunities</a:t>
+            </a:r>
+            <a:endParaRPr/>
+          </a:p>
+        </p:txBody>
+      </p:sp>
+      <p:sp>
+        <p:nvSpPr>
+          <p:cNvPr id="177" name="Google Shape;177;p21"/>
+          <p:cNvSpPr txBox="1">
+            <a:spLocks noGrp="1"/>
+          </p:cNvSpPr>
+          <p:nvPr>
+            <p:ph type="ftr" idx="11"/>
+          </p:nvPr>
+        </p:nvSpPr>
+        <p:spPr>
+          <a:xfrm>
+            <a:off x="4572000" y="6506896"/>
+            <a:ext cx="4114800" cy="365100"/>
+          </a:xfrm>
+          <a:prstGeom prst="rect">
+            <a:avLst/>
+          </a:prstGeom>
+          <a:noFill/>
+          <a:ln>
+            <a:noFill/>
+          </a:ln>
+        </p:spPr>
+        <p:txBody>
+          <a:bodyPr spcFirstLastPara="1" wrap="square" lIns="91425" tIns="45700" rIns="91425" bIns="45700" anchor="ctr" anchorCtr="0">
+            <a:noAutofit/>
+          </a:bodyPr>
+          <a:lstStyle/>
+          <a:p>
+            <a:pPr marL="0" lvl="0" indent="0" algn="r" rtl="0">
+              <a:lnSpc>
+                <a:spcPct val="100000"/>
+              </a:lnSpc>
+              <a:spcBef>
+                <a:spcPts val="0"/>
+              </a:spcBef>
+              <a:spcAft>
+                <a:spcPts val="0"/>
+              </a:spcAft>
+              <a:buSzPts val="1400"/>
+              <a:buNone/>
+            </a:pPr>
+            <a:r>
+              <a:rPr lang="en-US"/>
+              <a:t>Reproducibility Principles</a:t>
+            </a:r>
+            <a:endParaRPr/>
+          </a:p>
+        </p:txBody>
+      </p:sp>
+      <p:sp>
+        <p:nvSpPr>
+          <p:cNvPr id="179" name="Google Shape;179;p21"/>
+          <p:cNvSpPr txBox="1"/>
+          <p:nvPr/>
+        </p:nvSpPr>
+        <p:spPr>
+          <a:xfrm>
+            <a:off x="457200" y="5608381"/>
+            <a:ext cx="8547900" cy="460304"/>
+          </a:xfrm>
+          <a:prstGeom prst="rect">
+            <a:avLst/>
+          </a:prstGeom>
+          <a:noFill/>
+          <a:ln>
+            <a:noFill/>
+          </a:ln>
+        </p:spPr>
+        <p:txBody>
+          <a:bodyPr spcFirstLastPara="1" wrap="square" lIns="91425" tIns="45700" rIns="91425" bIns="45700" anchor="t" anchorCtr="0">
+            <a:noAutofit/>
+          </a:bodyPr>
+          <a:lstStyle/>
+          <a:p>
+            <a:pPr>
+              <a:lnSpc>
+                <a:spcPct val="115000"/>
+              </a:lnSpc>
+            </a:pPr>
+            <a:r>
+              <a:rPr lang="en-US" sz="1800" i="1">
+                <a:solidFill>
+                  <a:schemeClr val="dk1"/>
+                </a:solidFill>
+              </a:rPr>
+              <a:t>Will you or your colleague be able to do this years from now?</a:t>
+            </a:r>
+            <a:endParaRPr lang="en-US" sz="1800" b="1" i="1">
+              <a:solidFill>
+                <a:schemeClr val="dk1"/>
+              </a:solidFill>
+            </a:endParaRPr>
+          </a:p>
+          <a:p>
+            <a:pPr marR="0" indent="0" algn="l" rtl="0">
+              <a:lnSpc>
+                <a:spcPct val="100000"/>
+              </a:lnSpc>
+              <a:spcBef>
+                <a:spcPts val="0"/>
+              </a:spcBef>
+              <a:spcAft>
+                <a:spcPts val="0"/>
+              </a:spcAft>
+              <a:buSzPts val="1800"/>
+              <a:buNone/>
+            </a:pPr>
+            <a:endParaRPr sz="1800" b="0" i="0" u="none" strike="noStrike" cap="none">
+              <a:solidFill>
+                <a:srgbClr val="000000"/>
+              </a:solidFill>
+              <a:latin typeface="Arial"/>
+              <a:ea typeface="Arial"/>
+              <a:cs typeface="Arial"/>
+            </a:endParaRPr>
+          </a:p>
+          <a:p>
+            <a:pPr marR="0" indent="0" algn="l" rtl="0">
+              <a:lnSpc>
+                <a:spcPct val="100000"/>
+              </a:lnSpc>
+              <a:spcBef>
+                <a:spcPts val="0"/>
+              </a:spcBef>
+              <a:spcAft>
+                <a:spcPts val="0"/>
+              </a:spcAft>
+              <a:buClr>
+                <a:srgbClr val="000000"/>
+              </a:buClr>
+              <a:buSzPts val="1800"/>
+              <a:buFont typeface="Arial"/>
+              <a:buNone/>
+            </a:pPr>
+            <a:endParaRPr sz="1800" b="0" i="0" u="none" strike="noStrike" cap="none">
+              <a:solidFill>
+                <a:schemeClr val="dk1"/>
+              </a:solidFill>
+              <a:latin typeface="Arial"/>
+              <a:ea typeface="Arial"/>
+              <a:cs typeface="Arial"/>
+            </a:endParaRPr>
+          </a:p>
+          <a:p>
+            <a:pPr marL="0" marR="0" lvl="0" indent="0" algn="l" rtl="0">
+              <a:lnSpc>
+                <a:spcPct val="100000"/>
+              </a:lnSpc>
+              <a:spcBef>
+                <a:spcPts val="0"/>
+              </a:spcBef>
+              <a:spcAft>
+                <a:spcPts val="0"/>
+              </a:spcAft>
+              <a:buClr>
+                <a:srgbClr val="000000"/>
+              </a:buClr>
+              <a:buSzPts val="1800"/>
+              <a:buFont typeface="Arial"/>
+              <a:buNone/>
+            </a:pPr>
+            <a:endParaRPr sz="1800" b="0" i="0" u="none" strike="noStrike" cap="none">
+              <a:solidFill>
+                <a:schemeClr val="dk1"/>
+              </a:solidFill>
+              <a:latin typeface="Arial"/>
+              <a:ea typeface="Arial"/>
+              <a:cs typeface="Arial"/>
+              <a:sym typeface="Arial"/>
+            </a:endParaRPr>
+          </a:p>
+        </p:txBody>
+      </p:sp>
+      <p:pic>
+        <p:nvPicPr>
+          <p:cNvPr id="180" name="Google Shape;180;p21"/>
+          <p:cNvPicPr preferRelativeResize="0"/>
+          <p:nvPr/>
+        </p:nvPicPr>
+        <p:blipFill>
+          <a:blip r:embed="rId3">
+            <a:alphaModFix/>
+          </a:blip>
+          <a:stretch>
+            <a:fillRect/>
+          </a:stretch>
+        </p:blipFill>
+        <p:spPr>
+          <a:xfrm>
+            <a:off x="457206" y="1143000"/>
+            <a:ext cx="6843643" cy="3849549"/>
+          </a:xfrm>
+          <a:prstGeom prst="rect">
+            <a:avLst/>
+          </a:prstGeom>
+          <a:noFill/>
+          <a:ln>
+            <a:noFill/>
+          </a:ln>
+        </p:spPr>
+      </p:pic>
+    </p:spTree>
+  </p:cSld>
+  <p:clrMapOvr>
+    <a:masterClrMapping/>
+  </p:clrMapOvr>
+</p:sld>
+</file>
+
 <file path=ppt/slides/slide9.xml><?xml version="1.0" encoding="utf-8"?>
 <p:sld xmlns:a="http://schemas.openxmlformats.org/drawingml/2006/main" xmlns:r="http://schemas.openxmlformats.org/officeDocument/2006/relationships" xmlns:p="http://schemas.openxmlformats.org/presentationml/2006/main">
   <p:cSld>
@@ -31389,14 +31874,10 @@
           </a:bodyPr>
           <a:lstStyle/>
           <a:p>
-            <a:pPr>
-              <a:buSzPts val="3200"/>
-            </a:pPr>
             <a:r>
               <a:rPr lang="en-US"/>
-              <a:t>Automation Opportunities</a:t>
-            </a:r>
-            <a:endParaRPr/>
+              <a:t>Automation Opportunities For You?</a:t>
+            </a:r>
           </a:p>
         </p:txBody>
       </p:sp>
@@ -31450,163 +31931,196 @@
           </a:p>
         </p:txBody>
       </p:sp>
-      <p:sp>
-        <p:nvSpPr>
-          <p:cNvPr id="179" name="Google Shape;179;p21"/>
-          <p:cNvSpPr txBox="1"/>
-          <p:nvPr/>
-        </p:nvSpPr>
-        <p:spPr>
-          <a:xfrm>
-            <a:off x="457200" y="5608381"/>
-            <a:ext cx="8547900" cy="460304"/>
-          </a:xfrm>
-          <a:prstGeom prst="rect">
-            <a:avLst/>
-          </a:prstGeom>
-          <a:noFill/>
-          <a:ln>
-            <a:noFill/>
-          </a:ln>
-        </p:spPr>
-        <p:txBody>
-          <a:bodyPr spcFirstLastPara="1" wrap="square" lIns="91425" tIns="45700" rIns="91425" bIns="45700" anchor="t" anchorCtr="0">
-            <a:noAutofit/>
-          </a:bodyPr>
-          <a:lstStyle/>
-          <a:p>
-            <a:pPr>
-              <a:lnSpc>
-                <a:spcPct val="115000"/>
-              </a:lnSpc>
-            </a:pPr>
-            <a:r>
-              <a:rPr lang="en-US" sz="1800" i="1">
-                <a:solidFill>
-                  <a:schemeClr val="dk1"/>
-                </a:solidFill>
-              </a:rPr>
-              <a:t>Will you or your colleague be able to do this years from now?</a:t>
-            </a:r>
-            <a:endParaRPr lang="en-US" sz="1800" b="1" i="1">
-              <a:solidFill>
-                <a:schemeClr val="dk1"/>
-              </a:solidFill>
-            </a:endParaRPr>
-          </a:p>
-          <a:p>
-            <a:pPr marR="0" indent="0" algn="l" rtl="0">
-              <a:lnSpc>
-                <a:spcPct val="100000"/>
-              </a:lnSpc>
-              <a:spcBef>
-                <a:spcPts val="0"/>
-              </a:spcBef>
-              <a:spcAft>
-                <a:spcPts val="0"/>
-              </a:spcAft>
-              <a:buSzPts val="1800"/>
-              <a:buNone/>
-            </a:pPr>
-            <a:endParaRPr sz="1800" b="0" i="0" u="none" strike="noStrike" cap="none">
-              <a:solidFill>
-                <a:srgbClr val="000000"/>
-              </a:solidFill>
-              <a:latin typeface="Arial"/>
-              <a:ea typeface="Arial"/>
-              <a:cs typeface="Arial"/>
-            </a:endParaRPr>
-          </a:p>
-          <a:p>
-            <a:pPr marR="0" indent="0" algn="l" rtl="0">
-              <a:lnSpc>
-                <a:spcPct val="100000"/>
-              </a:lnSpc>
-              <a:spcBef>
-                <a:spcPts val="0"/>
-              </a:spcBef>
-              <a:spcAft>
-                <a:spcPts val="0"/>
-              </a:spcAft>
-              <a:buClr>
-                <a:srgbClr val="000000"/>
-              </a:buClr>
-              <a:buSzPts val="1800"/>
-              <a:buFont typeface="Arial"/>
-              <a:buNone/>
-            </a:pPr>
-            <a:endParaRPr sz="1800" b="0" i="0" u="none" strike="noStrike" cap="none">
-              <a:solidFill>
-                <a:schemeClr val="dk1"/>
-              </a:solidFill>
-              <a:latin typeface="Arial"/>
-              <a:ea typeface="Arial"/>
-              <a:cs typeface="Arial"/>
-            </a:endParaRPr>
-          </a:p>
-          <a:p>
-            <a:pPr marL="0" marR="0" lvl="0" indent="0" algn="l" rtl="0">
-              <a:lnSpc>
-                <a:spcPct val="100000"/>
-              </a:lnSpc>
-              <a:spcBef>
-                <a:spcPts val="0"/>
-              </a:spcBef>
-              <a:spcAft>
-                <a:spcPts val="0"/>
-              </a:spcAft>
-              <a:buClr>
-                <a:srgbClr val="000000"/>
-              </a:buClr>
-              <a:buSzPts val="1800"/>
-              <a:buFont typeface="Arial"/>
-              <a:buNone/>
-            </a:pPr>
-            <a:endParaRPr sz="1800" b="0" i="0" u="none" strike="noStrike" cap="none">
-              <a:solidFill>
-                <a:schemeClr val="dk1"/>
-              </a:solidFill>
-              <a:latin typeface="Arial"/>
-              <a:ea typeface="Arial"/>
-              <a:cs typeface="Arial"/>
-              <a:sym typeface="Arial"/>
-            </a:endParaRPr>
-          </a:p>
-        </p:txBody>
-      </p:sp>
       <p:pic>
         <p:nvPicPr>
-          <p:cNvPr id="180" name="Google Shape;180;p21"/>
-          <p:cNvPicPr preferRelativeResize="0"/>
+          <p:cNvPr id="4" name="Picture 4" descr="Graphical user interface, application&#10;&#10;Description automatically generated">
+            <a:extLst>
+              <a:ext uri="{FF2B5EF4-FFF2-40B4-BE49-F238E27FC236}">
+                <a16:creationId xmlns:a16="http://schemas.microsoft.com/office/drawing/2014/main" id="{3DC87846-D2C9-27E3-BCF5-F54BA0E4016D}"/>
+              </a:ext>
+            </a:extLst>
+          </p:cNvPr>
+          <p:cNvPicPr>
+            <a:picLocks noChangeAspect="1"/>
+          </p:cNvPicPr>
           <p:nvPr/>
         </p:nvPicPr>
         <p:blipFill>
-          <a:blip r:embed="rId3">
-            <a:alphaModFix/>
-          </a:blip>
+          <a:blip r:embed="rId3"/>
           <a:stretch>
             <a:fillRect/>
           </a:stretch>
         </p:blipFill>
         <p:spPr>
           <a:xfrm>
-            <a:off x="457206" y="1143000"/>
-            <a:ext cx="6843643" cy="3849549"/>
+            <a:off x="4620036" y="1519050"/>
+            <a:ext cx="4453581" cy="1533158"/>
           </a:xfrm>
           <a:prstGeom prst="rect">
             <a:avLst/>
           </a:prstGeom>
-          <a:noFill/>
           <a:ln>
-            <a:noFill/>
+            <a:solidFill>
+              <a:schemeClr val="tx1"/>
+            </a:solidFill>
+          </a:ln>
+        </p:spPr>
+      </p:pic>
+      <p:pic>
+        <p:nvPicPr>
+          <p:cNvPr id="5" name="Picture 5" descr="Graphical user interface, application&#10;&#10;Description automatically generated">
+            <a:extLst>
+              <a:ext uri="{FF2B5EF4-FFF2-40B4-BE49-F238E27FC236}">
+                <a16:creationId xmlns:a16="http://schemas.microsoft.com/office/drawing/2014/main" id="{74EB437C-D31C-B442-1FB8-A6B4E1F09824}"/>
+              </a:ext>
+            </a:extLst>
+          </p:cNvPr>
+          <p:cNvPicPr>
+            <a:picLocks noChangeAspect="1"/>
+          </p:cNvPicPr>
+          <p:nvPr/>
+        </p:nvPicPr>
+        <p:blipFill>
+          <a:blip r:embed="rId4"/>
+          <a:stretch>
+            <a:fillRect/>
+          </a:stretch>
+        </p:blipFill>
+        <p:spPr>
+          <a:xfrm>
+            <a:off x="205646" y="1146597"/>
+            <a:ext cx="4234355" cy="2975254"/>
+          </a:xfrm>
+          <a:prstGeom prst="rect">
+            <a:avLst/>
+          </a:prstGeom>
+          <a:ln>
+            <a:solidFill>
+              <a:schemeClr val="tx1"/>
+            </a:solidFill>
+          </a:ln>
+        </p:spPr>
+      </p:pic>
+      <p:pic>
+        <p:nvPicPr>
+          <p:cNvPr id="6" name="Picture 6" descr="Graphical user interface, text, application, email&#10;&#10;Description automatically generated">
+            <a:extLst>
+              <a:ext uri="{FF2B5EF4-FFF2-40B4-BE49-F238E27FC236}">
+                <a16:creationId xmlns:a16="http://schemas.microsoft.com/office/drawing/2014/main" id="{19B7845B-0C43-CEC9-8729-8CA6E51BFD48}"/>
+              </a:ext>
+            </a:extLst>
+          </p:cNvPr>
+          <p:cNvPicPr>
+            <a:picLocks noChangeAspect="1"/>
+          </p:cNvPicPr>
+          <p:nvPr/>
+        </p:nvPicPr>
+        <p:blipFill>
+          <a:blip r:embed="rId5"/>
+          <a:stretch>
+            <a:fillRect/>
+          </a:stretch>
+        </p:blipFill>
+        <p:spPr>
+          <a:xfrm>
+            <a:off x="4560915" y="3647667"/>
+            <a:ext cx="4457468" cy="2293318"/>
+          </a:xfrm>
+          <a:prstGeom prst="rect">
+            <a:avLst/>
+          </a:prstGeom>
+          <a:ln>
+            <a:solidFill>
+              <a:schemeClr val="tx1"/>
+            </a:solidFill>
           </a:ln>
         </p:spPr>
       </p:pic>
     </p:spTree>
+    <p:extLst>
+      <p:ext uri="{BB962C8B-B14F-4D97-AF65-F5344CB8AC3E}">
+        <p14:creationId xmlns:p14="http://schemas.microsoft.com/office/powerpoint/2010/main" val="3050248158"/>
+      </p:ext>
+    </p:extLst>
   </p:cSld>
   <p:clrMapOvr>
     <a:masterClrMapping/>
   </p:clrMapOvr>
+  <p:timing>
+    <p:tnLst>
+      <p:par>
+        <p:cTn id="1" dur="indefinite" restart="never" nodeType="tmRoot">
+          <p:childTnLst>
+            <p:seq concurrent="1" nextAc="seek">
+              <p:cTn id="2" dur="indefinite" nodeType="mainSeq">
+                <p:childTnLst>
+                  <p:par>
+                    <p:cTn id="3" fill="hold">
+                      <p:stCondLst>
+                        <p:cond delay="indefinite"/>
+                      </p:stCondLst>
+                      <p:childTnLst>
+                        <p:par>
+                          <p:cTn id="4" fill="hold">
+                            <p:stCondLst>
+                              <p:cond delay="0"/>
+                            </p:stCondLst>
+                            <p:childTnLst>
+                              <p:par>
+                                <p:cTn id="5" presetID="1" presetClass="entr" presetSubtype="0" fill="hold" nodeType="clickEffect">
+                                  <p:stCondLst>
+                                    <p:cond delay="0"/>
+                                  </p:stCondLst>
+                                  <p:childTnLst>
+                                    <p:set>
+                                      <p:cBhvr>
+                                        <p:cTn id="6" dur="1" fill="hold">
+                                          <p:stCondLst>
+                                            <p:cond delay="0"/>
+                                          </p:stCondLst>
+                                        </p:cTn>
+                                        <p:tgtEl>
+                                          <p:spTgt spid="5"/>
+                                        </p:tgtEl>
+                                        <p:attrNameLst>
+                                          <p:attrName>style.visibility</p:attrName>
+                                        </p:attrNameLst>
+                                      </p:cBhvr>
+                                      <p:to>
+                                        <p:strVal val="visible"/>
+                                      </p:to>
+                                    </p:set>
+                                  </p:childTnLst>
+                                </p:cTn>
+                              </p:par>
+                            </p:childTnLst>
+                          </p:cTn>
+                        </p:par>
+                      </p:childTnLst>
+                    </p:cTn>
+                  </p:par>
+                </p:childTnLst>
+              </p:cTn>
+              <p:prevCondLst>
+                <p:cond evt="onPrev" delay="0">
+                  <p:tgtEl>
+                    <p:sldTgt/>
+                  </p:tgtEl>
+                </p:cond>
+              </p:prevCondLst>
+              <p:nextCondLst>
+                <p:cond evt="onNext" delay="0">
+                  <p:tgtEl>
+                    <p:sldTgt/>
+                  </p:tgtEl>
+                </p:cond>
+              </p:nextCondLst>
+            </p:seq>
+          </p:childTnLst>
+        </p:cTn>
+      </p:par>
+    </p:tnLst>
+  </p:timing>
 </p:sld>
 </file>
 

</xml_diff>